<commit_message>
IA definindo roteiro com pergunta padronizada.
</commit_message>
<xml_diff>
--- a/IA/auto_apresentacao_IA.pptx
+++ b/IA/auto_apresentacao_IA.pptx
@@ -3113,7 +3113,7 @@
           <a:lstStyle/>
           <a:p>
             <a:r>
-              <a:t>Introdução à Eletrônica Digital</a:t>
+              <a:t>Autor: [Seu nome]</a:t>
             </a:r>
           </a:p>
         </p:txBody>
@@ -3132,11 +3132,7 @@
         <p:txBody>
           <a:bodyPr/>
           <a:lstStyle/>
-          <a:p>
-            <a:r>
-              <a:t>- Autor: [Seu nome]</a:t>
-            </a:r>
-          </a:p>
+          <a:p/>
         </p:txBody>
       </p:sp>
     </p:spTree>
@@ -3173,7 +3169,7 @@
           <a:lstStyle/>
           <a:p>
             <a:r>
-              <a:t>Conclusão</a:t>
+              <a:t>Memórias Digitais</a:t>
             </a:r>
           </a:p>
         </p:txBody>
@@ -3194,12 +3190,17 @@
           <a:lstStyle/>
           <a:p>
             <a:r>
-              <a:t>Breve resumo dos principais pontos abordados</a:t>
-            </a:r>
-          </a:p>
-          <a:p>
-            <a:r>
-              <a:t>Importância da eletrônica digital na sociedade moderna</a:t>
+              <a:t>Recapitulação dos principais pontos abordados</a:t>
+            </a:r>
+          </a:p>
+          <a:p>
+            <a:r>
+              <a:t>Importância da eletrônica digital na tecnologia atual</a:t>
+            </a:r>
+          </a:p>
+          <a:p>
+            <a:r>
+              <a:t>Referências utilizadas</a:t>
             </a:r>
           </a:p>
         </p:txBody>
@@ -3238,7 +3239,7 @@
           <a:lstStyle/>
           <a:p>
             <a:r>
-              <a:t>O que é Eletrônica Digital?</a:t>
+              <a:t>Introdução à Eletrônica Digital</a:t>
             </a:r>
           </a:p>
         </p:txBody>
@@ -3257,14 +3258,15 @@
         <p:txBody>
           <a:bodyPr/>
           <a:lstStyle/>
-          <a:p>
-            <a:r>
-              <a:t>Definição de Eletrônica Digital</a:t>
-            </a:r>
-          </a:p>
-          <a:p>
-            <a:r>
-              <a:t>Principais características da eletrônica digital</a:t>
+          <a:p/>
+          <a:p>
+            <a:r>
+              <a:t>Definição de eletrônica digital</a:t>
+            </a:r>
+          </a:p>
+          <a:p>
+            <a:r>
+              <a:t>Diferença entre eletrônica analógica e digital</a:t>
             </a:r>
           </a:p>
         </p:txBody>
@@ -3303,7 +3305,7 @@
           <a:lstStyle/>
           <a:p>
             <a:r>
-              <a:t>Sistemas de Numeração na Eletrônica Digital</a:t>
+              <a:t>O que é Eletrônica Digital?</a:t>
             </a:r>
           </a:p>
         </p:txBody>
@@ -3324,12 +3326,17 @@
           <a:lstStyle/>
           <a:p>
             <a:r>
-              <a:t>Exploração dos sistemas decimal, binário e hexadecimal</a:t>
-            </a:r>
-          </a:p>
-          <a:p>
-            <a:r>
-              <a:t>Conversão entre diferentes sistemas de numeração</a:t>
+              <a:t>Explicação do sistema binário</a:t>
+            </a:r>
+          </a:p>
+          <a:p>
+            <a:r>
+              <a:t>Representação de números em base 2</a:t>
+            </a:r>
+          </a:p>
+          <a:p>
+            <a:r>
+              <a:t>Conversão entre base 10 e base 2</a:t>
             </a:r>
           </a:p>
         </p:txBody>
@@ -3368,7 +3375,7 @@
           <a:lstStyle/>
           <a:p>
             <a:r>
-              <a:t>Portas Lógicas na Eletrônica Digital</a:t>
+              <a:t>Sistemas Binários</a:t>
             </a:r>
           </a:p>
         </p:txBody>
@@ -3389,12 +3396,17 @@
           <a:lstStyle/>
           <a:p>
             <a:r>
-              <a:t>Apresentação das portas lógicas AND, OR, NOT, NAND, NOR e XOR</a:t>
-            </a:r>
-          </a:p>
-          <a:p>
-            <a:r>
-              <a:t>Tabelas verdade e representação gráfica de cada porta</a:t>
+              <a:t>Definição de portas lógicas</a:t>
+            </a:r>
+          </a:p>
+          <a:p>
+            <a:r>
+              <a:t>Tipos de portas lógicas (AND, OR, NOT, XOR, etc.)</a:t>
+            </a:r>
+          </a:p>
+          <a:p>
+            <a:r>
+              <a:t>Tabela verdade das portas lógicas</a:t>
             </a:r>
           </a:p>
         </p:txBody>
@@ -3433,7 +3445,7 @@
           <a:lstStyle/>
           <a:p>
             <a:r>
-              <a:t>Circuitos Combinacionais</a:t>
+              <a:t>Portas Lógicas</a:t>
             </a:r>
           </a:p>
         </p:txBody>
@@ -3454,12 +3466,17 @@
           <a:lstStyle/>
           <a:p>
             <a:r>
-              <a:t>Combinação de portas lógicas para criar circuitos mais complexos</a:t>
-            </a:r>
-          </a:p>
-          <a:p>
-            <a:r>
-              <a:t>Exemplos de projetos de circuitos combinacionais</a:t>
+              <a:t>Explicação da álgebra de Boole</a:t>
+            </a:r>
+          </a:p>
+          <a:p>
+            <a:r>
+              <a:t>Principais operações lógicas (AND, OR, NOT)</a:t>
+            </a:r>
+          </a:p>
+          <a:p>
+            <a:r>
+              <a:t>Leis de De Morgan</a:t>
             </a:r>
           </a:p>
         </p:txBody>
@@ -3498,7 +3515,7 @@
           <a:lstStyle/>
           <a:p>
             <a:r>
-              <a:t>Circuitos Sequenciais</a:t>
+              <a:t>Álgebra de Boole</a:t>
             </a:r>
           </a:p>
         </p:txBody>
@@ -3519,12 +3536,17 @@
           <a:lstStyle/>
           <a:p>
             <a:r>
-              <a:t>Introdução aos circuitos que possuem memória - flip-flops</a:t>
-            </a:r>
-          </a:p>
-          <a:p>
-            <a:r>
-              <a:t>Noções básicas de registradores e contadores</a:t>
+              <a:t>Descrição dos componentes de um circuito lógico</a:t>
+            </a:r>
+          </a:p>
+          <a:p>
+            <a:r>
+              <a:t>Diagramas de circuitos lógicos</a:t>
+            </a:r>
+          </a:p>
+          <a:p>
+            <a:r>
+              <a:t>Exemplos de aplicação de circuitos lógicos</a:t>
             </a:r>
           </a:p>
         </p:txBody>
@@ -3563,7 +3585,7 @@
           <a:lstStyle/>
           <a:p>
             <a:r>
-              <a:t>Aritmética Binária</a:t>
+              <a:t>Circuitos Lógicos</a:t>
             </a:r>
           </a:p>
         </p:txBody>
@@ -3584,12 +3606,17 @@
           <a:lstStyle/>
           <a:p>
             <a:r>
-              <a:t>Operações matemáticas com números binários</a:t>
-            </a:r>
-          </a:p>
-          <a:p>
-            <a:r>
-              <a:t>Adição, subtração, multiplicação e divisão binária</a:t>
+              <a:t>Introdução a registradores e flip-flops</a:t>
+            </a:r>
+          </a:p>
+          <a:p>
+            <a:r>
+              <a:t>Tipos de flip-flops (SR, JK, D, T)</a:t>
+            </a:r>
+          </a:p>
+          <a:p>
+            <a:r>
+              <a:t>Aplicações de flip-flops em circuitos sequenciais</a:t>
             </a:r>
           </a:p>
         </p:txBody>
@@ -3628,7 +3655,7 @@
           <a:lstStyle/>
           <a:p>
             <a:r>
-              <a:t>Memória Digital na Eletrônica</a:t>
+              <a:t>Registradores e Flip-Flops</a:t>
             </a:r>
           </a:p>
         </p:txBody>
@@ -3649,12 +3676,17 @@
           <a:lstStyle/>
           <a:p>
             <a:r>
-              <a:t>Tipos de memória: ROM, RAM, EEPROM, entre outros</a:t>
-            </a:r>
-          </a:p>
-          <a:p>
-            <a:r>
-              <a:t>Aplicações e importância da memória digital</a:t>
+              <a:t>Conceito de contadores digitais</a:t>
+            </a:r>
+          </a:p>
+          <a:p>
+            <a:r>
+              <a:t>Tipos de contadores (síncronos e assíncronos)</a:t>
+            </a:r>
+          </a:p>
+          <a:p>
+            <a:r>
+              <a:t>Exemplos de aplicação de contadores</a:t>
             </a:r>
           </a:p>
         </p:txBody>
@@ -3693,7 +3725,7 @@
           <a:lstStyle/>
           <a:p>
             <a:r>
-              <a:t>Circuitos Integrados</a:t>
+              <a:t>Contadores Digitais</a:t>
             </a:r>
           </a:p>
         </p:txBody>
@@ -3714,12 +3746,17 @@
           <a:lstStyle/>
           <a:p>
             <a:r>
-              <a:t>Conceitos básicos de circuitos integrados</a:t>
-            </a:r>
-          </a:p>
-          <a:p>
-            <a:r>
-              <a:t>Uso e vantagens dos CIs na eletrônica digital</a:t>
+              <a:t>Introdução a memórias digitais (RAM, ROM, EEPROM)</a:t>
+            </a:r>
+          </a:p>
+          <a:p>
+            <a:r>
+              <a:t>Funcionamento e características das memórias digitais</a:t>
+            </a:r>
+          </a:p>
+          <a:p>
+            <a:r>
+              <a:t>Aplicações de memórias digitais em sistemas eletrônicos</a:t>
             </a:r>
           </a:p>
         </p:txBody>

</xml_diff>

<commit_message>
adicionando api de busca de imagens
</commit_message>
<xml_diff>
--- a/IA/auto_apresentacao_IA.pptx
+++ b/IA/auto_apresentacao_IA.pptx
@@ -3113,7 +3113,7 @@
           <a:lstStyle/>
           <a:p>
             <a:r>
-              <a:t>Autor: [Seu nome]</a:t>
+              <a:t>Introdução à Eletrônica Digital</a:t>
             </a:r>
           </a:p>
         </p:txBody>
@@ -3132,7 +3132,11 @@
         <p:txBody>
           <a:bodyPr/>
           <a:lstStyle/>
-          <a:p/>
+          <a:p>
+            <a:r>
+              <a:t>- Autor: [Seu nome]</a:t>
+            </a:r>
+          </a:p>
         </p:txBody>
       </p:sp>
     </p:spTree>
@@ -3169,7 +3173,7 @@
           <a:lstStyle/>
           <a:p>
             <a:r>
-              <a:t>Memórias Digitais</a:t>
+              <a:t>Conclusão</a:t>
             </a:r>
           </a:p>
         </p:txBody>
@@ -3200,7 +3204,7 @@
           </a:p>
           <a:p>
             <a:r>
-              <a:t>Referências utilizadas</a:t>
+              <a:t>Referências utilizadas na apresentação</a:t>
             </a:r>
           </a:p>
         </p:txBody>
@@ -3239,7 +3243,7 @@
           <a:lstStyle/>
           <a:p>
             <a:r>
-              <a:t>Introdução à Eletrônica Digital</a:t>
+              <a:t>O que é Eletrônica Digital?</a:t>
             </a:r>
           </a:p>
         </p:txBody>
@@ -3258,7 +3262,11 @@
         <p:txBody>
           <a:bodyPr/>
           <a:lstStyle/>
-          <a:p/>
+          <a:p>
+            <a:r>
+              <a:t>Introdução ao tema</a:t>
+            </a:r>
+          </a:p>
           <a:p>
             <a:r>
               <a:t>Definição de eletrônica digital</a:t>
@@ -3266,7 +3274,7 @@
           </a:p>
           <a:p>
             <a:r>
-              <a:t>Diferença entre eletrônica analógica e digital</a:t>
+              <a:t>Importância da eletrônica digital no mundo moderno</a:t>
             </a:r>
           </a:p>
         </p:txBody>
@@ -3305,7 +3313,7 @@
           <a:lstStyle/>
           <a:p>
             <a:r>
-              <a:t>O que é Eletrônica Digital?</a:t>
+              <a:t>Sinais Digitais e Sinais Analógicos</a:t>
             </a:r>
           </a:p>
         </p:txBody>
@@ -3326,17 +3334,17 @@
           <a:lstStyle/>
           <a:p>
             <a:r>
-              <a:t>Explicação do sistema binário</a:t>
-            </a:r>
-          </a:p>
-          <a:p>
-            <a:r>
-              <a:t>Representação de números em base 2</a:t>
-            </a:r>
-          </a:p>
-          <a:p>
-            <a:r>
-              <a:t>Conversão entre base 10 e base 2</a:t>
+              <a:t>Diferença entre sinais digitais e analógicos</a:t>
+            </a:r>
+          </a:p>
+          <a:p>
+            <a:r>
+              <a:t>Características dos sinais digitais</a:t>
+            </a:r>
+          </a:p>
+          <a:p>
+            <a:r>
+              <a:t>Vantagens dos sinais digitais</a:t>
             </a:r>
           </a:p>
         </p:txBody>
@@ -3375,7 +3383,7 @@
           <a:lstStyle/>
           <a:p>
             <a:r>
-              <a:t>Sistemas Binários</a:t>
+              <a:t>Sistemas Digitais</a:t>
             </a:r>
           </a:p>
         </p:txBody>
@@ -3396,17 +3404,17 @@
           <a:lstStyle/>
           <a:p>
             <a:r>
-              <a:t>Definição de portas lógicas</a:t>
-            </a:r>
-          </a:p>
-          <a:p>
-            <a:r>
-              <a:t>Tipos de portas lógicas (AND, OR, NOT, XOR, etc.)</a:t>
-            </a:r>
-          </a:p>
-          <a:p>
-            <a:r>
-              <a:t>Tabela verdade das portas lógicas</a:t>
+              <a:t>Explicação sobre sistemas digitais</a:t>
+            </a:r>
+          </a:p>
+          <a:p>
+            <a:r>
+              <a:t>Exemplos de sistemas digitais comuns (computadores, celulares, etc.)</a:t>
+            </a:r>
+          </a:p>
+          <a:p>
+            <a:r>
+              <a:t>Benefícios dos sistemas digitais</a:t>
             </a:r>
           </a:p>
         </p:txBody>
@@ -3445,7 +3453,7 @@
           <a:lstStyle/>
           <a:p>
             <a:r>
-              <a:t>Portas Lógicas</a:t>
+              <a:t>Componentes Básicos da Eletrônica Digital</a:t>
             </a:r>
           </a:p>
         </p:txBody>
@@ -3466,17 +3474,17 @@
           <a:lstStyle/>
           <a:p>
             <a:r>
-              <a:t>Explicação da álgebra de Boole</a:t>
-            </a:r>
-          </a:p>
-          <a:p>
-            <a:r>
-              <a:t>Principais operações lógicas (AND, OR, NOT)</a:t>
-            </a:r>
-          </a:p>
-          <a:p>
-            <a:r>
-              <a:t>Leis de De Morgan</a:t>
+              <a:t>Introdução aos principais componentes da eletrônica digital</a:t>
+            </a:r>
+          </a:p>
+          <a:p>
+            <a:r>
+              <a:t>Tabela com componentes básicos (transistores, diodos, resistores, etc.)</a:t>
+            </a:r>
+          </a:p>
+          <a:p>
+            <a:r>
+              <a:t>Função de cada componente na eletrônica digital</a:t>
             </a:r>
           </a:p>
         </p:txBody>
@@ -3515,7 +3523,7 @@
           <a:lstStyle/>
           <a:p>
             <a:r>
-              <a:t>Álgebra de Boole</a:t>
+              <a:t>Portas Lógicas</a:t>
             </a:r>
           </a:p>
         </p:txBody>
@@ -3536,17 +3544,17 @@
           <a:lstStyle/>
           <a:p>
             <a:r>
-              <a:t>Descrição dos componentes de um circuito lógico</a:t>
-            </a:r>
-          </a:p>
-          <a:p>
-            <a:r>
-              <a:t>Diagramas de circuitos lógicos</a:t>
-            </a:r>
-          </a:p>
-          <a:p>
-            <a:r>
-              <a:t>Exemplos de aplicação de circuitos lógicos</a:t>
+              <a:t>Explicação sobre o conceito de portas lógicas</a:t>
+            </a:r>
+          </a:p>
+          <a:p>
+            <a:r>
+              <a:t>Tipos de portas lógicas (AND, OR, NOT, XOR, NAND, NOR)</a:t>
+            </a:r>
+          </a:p>
+          <a:p>
+            <a:r>
+              <a:t>Exemplificação das portas lógicas através de diagramas</a:t>
             </a:r>
           </a:p>
         </p:txBody>
@@ -3585,7 +3593,7 @@
           <a:lstStyle/>
           <a:p>
             <a:r>
-              <a:t>Circuitos Lógicos</a:t>
+              <a:t>Circuitos Combinacionais</a:t>
             </a:r>
           </a:p>
         </p:txBody>
@@ -3606,17 +3614,17 @@
           <a:lstStyle/>
           <a:p>
             <a:r>
-              <a:t>Introdução a registradores e flip-flops</a:t>
-            </a:r>
-          </a:p>
-          <a:p>
-            <a:r>
-              <a:t>Tipos de flip-flops (SR, JK, D, T)</a:t>
-            </a:r>
-          </a:p>
-          <a:p>
-            <a:r>
-              <a:t>Aplicações de flip-flops em circuitos sequenciais</a:t>
+              <a:t>Definição de circuitos combinacionais</a:t>
+            </a:r>
+          </a:p>
+          <a:p>
+            <a:r>
+              <a:t>Exemplos de circuitos combinacionais (decodificadores, multiplexadores, somadores)</a:t>
+            </a:r>
+          </a:p>
+          <a:p>
+            <a:r>
+              <a:t>Utilização de circuitos combinacionais na eletrônica digital</a:t>
             </a:r>
           </a:p>
         </p:txBody>
@@ -3655,7 +3663,7 @@
           <a:lstStyle/>
           <a:p>
             <a:r>
-              <a:t>Registradores e Flip-Flops</a:t>
+              <a:t>Circuitos Sequenciais</a:t>
             </a:r>
           </a:p>
         </p:txBody>
@@ -3676,17 +3684,17 @@
           <a:lstStyle/>
           <a:p>
             <a:r>
-              <a:t>Conceito de contadores digitais</a:t>
-            </a:r>
-          </a:p>
-          <a:p>
-            <a:r>
-              <a:t>Tipos de contadores (síncronos e assíncronos)</a:t>
-            </a:r>
-          </a:p>
-          <a:p>
-            <a:r>
-              <a:t>Exemplos de aplicação de contadores</a:t>
+              <a:t>Explicação sobre circuitos sequenciais</a:t>
+            </a:r>
+          </a:p>
+          <a:p>
+            <a:r>
+              <a:t>Tipos de circuitos sequenciais (flip-flops, contadores, registradores)</a:t>
+            </a:r>
+          </a:p>
+          <a:p>
+            <a:r>
+              <a:t>Aplicações dos circuitos sequenciais</a:t>
             </a:r>
           </a:p>
         </p:txBody>
@@ -3725,7 +3733,7 @@
           <a:lstStyle/>
           <a:p>
             <a:r>
-              <a:t>Contadores Digitais</a:t>
+              <a:t>Microcontroladores</a:t>
             </a:r>
           </a:p>
         </p:txBody>
@@ -3746,17 +3754,17 @@
           <a:lstStyle/>
           <a:p>
             <a:r>
-              <a:t>Introdução a memórias digitais (RAM, ROM, EEPROM)</a:t>
-            </a:r>
-          </a:p>
-          <a:p>
-            <a:r>
-              <a:t>Funcionamento e características das memórias digitais</a:t>
-            </a:r>
-          </a:p>
-          <a:p>
-            <a:r>
-              <a:t>Aplicações de memórias digitais em sistemas eletrônicos</a:t>
+              <a:t>Descrição de microcontroladores</a:t>
+            </a:r>
+          </a:p>
+          <a:p>
+            <a:r>
+              <a:t>Vantagens e aplicações dos microcontroladores</a:t>
+            </a:r>
+          </a:p>
+          <a:p>
+            <a:r>
+              <a:t>Exemplos de microcontroladores famosos (Arduino, PIC, STM32)</a:t>
             </a:r>
           </a:p>
         </p:txBody>

</xml_diff>

<commit_message>
gerando apresentacao a partir da api chat gpt incorporada
</commit_message>
<xml_diff>
--- a/IA/auto_apresentacao_IA.pptx
+++ b/IA/auto_apresentacao_IA.pptx
@@ -11,10 +11,6 @@
     <p:sldId id="259" r:id="rId10"/>
     <p:sldId id="260" r:id="rId11"/>
     <p:sldId id="261" r:id="rId12"/>
-    <p:sldId id="262" r:id="rId13"/>
-    <p:sldId id="263" r:id="rId14"/>
-    <p:sldId id="264" r:id="rId15"/>
-    <p:sldId id="265" r:id="rId16"/>
   </p:sldIdLst>
   <p:sldSz cx="9144000" cy="6858000" type="screen4x3"/>
   <p:notesSz cx="6858000" cy="9144000"/>
@@ -3113,7 +3109,7 @@
           <a:lstStyle/>
           <a:p>
             <a:r>
-              <a:t>Introdução à Eletrônica Digital</a:t>
+              <a:t>Inteligência Artificial</a:t>
             </a:r>
           </a:p>
         </p:txBody>
@@ -3134,77 +3130,7 @@
           <a:lstStyle/>
           <a:p>
             <a:r>
-              <a:t>- Autor: [Seu nome]</a:t>
-            </a:r>
-          </a:p>
-        </p:txBody>
-      </p:sp>
-    </p:spTree>
-  </p:cSld>
-  <p:clrMapOvr>
-    <a:masterClrMapping/>
-  </p:clrMapOvr>
-</p:sld>
-</file>
-
-<file path=ppt/slides/slide10.xml><?xml version="1.0" encoding="utf-8"?>
-<p:sld xmlns:a="http://schemas.openxmlformats.org/drawingml/2006/main" xmlns:p="http://schemas.openxmlformats.org/presentationml/2006/main" xmlns:r="http://schemas.openxmlformats.org/officeDocument/2006/relationships">
-  <p:cSld>
-    <p:spTree>
-      <p:nvGrpSpPr>
-        <p:cNvPr id="1" name=""/>
-        <p:cNvGrpSpPr/>
-        <p:nvPr/>
-      </p:nvGrpSpPr>
-      <p:grpSpPr/>
-      <p:sp>
-        <p:nvSpPr>
-          <p:cNvPr id="2" name="Title 1"/>
-          <p:cNvSpPr>
-            <a:spLocks noGrp="1"/>
-          </p:cNvSpPr>
-          <p:nvPr>
-            <p:ph type="title"/>
-          </p:nvPr>
-        </p:nvSpPr>
-        <p:spPr/>
-        <p:txBody>
-          <a:bodyPr/>
-          <a:lstStyle/>
-          <a:p>
-            <a:r>
-              <a:t>Conclusão</a:t>
-            </a:r>
-          </a:p>
-        </p:txBody>
-      </p:sp>
-      <p:sp>
-        <p:nvSpPr>
-          <p:cNvPr id="3" name="Content Placeholder 2"/>
-          <p:cNvSpPr>
-            <a:spLocks noGrp="1"/>
-          </p:cNvSpPr>
-          <p:nvPr>
-            <p:ph idx="1"/>
-          </p:nvPr>
-        </p:nvSpPr>
-        <p:spPr/>
-        <p:txBody>
-          <a:bodyPr/>
-          <a:lstStyle/>
-          <a:p>
-            <a:r>
-              <a:t>Recapitulação dos principais pontos abordados</a:t>
-            </a:r>
-          </a:p>
-          <a:p>
-            <a:r>
-              <a:t>Importância da eletrônica digital na tecnologia atual</a:t>
-            </a:r>
-          </a:p>
-          <a:p>
-            <a:r>
-              <a:t>Referências utilizadas na apresentação</a:t>
+              <a:t>Autor: Kézia</a:t>
             </a:r>
           </a:p>
         </p:txBody>
@@ -3243,7 +3169,7 @@
           <a:lstStyle/>
           <a:p>
             <a:r>
-              <a:t>O que é Eletrônica Digital?</a:t>
+              <a:t>O que é Inteligência Artificial?</a:t>
             </a:r>
           </a:p>
         </p:txBody>
@@ -3262,19 +3188,15 @@
         <p:txBody>
           <a:bodyPr/>
           <a:lstStyle/>
-          <a:p>
-            <a:r>
-              <a:t>Introdução ao tema</a:t>
-            </a:r>
-          </a:p>
-          <a:p>
-            <a:r>
-              <a:t>Definição de eletrônica digital</a:t>
-            </a:r>
-          </a:p>
-          <a:p>
-            <a:r>
-              <a:t>Importância da eletrônica digital no mundo moderno</a:t>
+          <a:p/>
+          <a:p>
+            <a:r>
+              <a:t>Definição de Inteligência Artificial</a:t>
+            </a:r>
+          </a:p>
+          <a:p>
+            <a:r>
+              <a:t>Capacidade de simular o pensamento humano através de algoritmos e sistemas computacionais</a:t>
             </a:r>
           </a:p>
         </p:txBody>
@@ -3313,7 +3235,7 @@
           <a:lstStyle/>
           <a:p>
             <a:r>
-              <a:t>Sinais Digitais e Sinais Analógicos</a:t>
+              <a:t>Aplicações da Inteligência Artificial</a:t>
             </a:r>
           </a:p>
         </p:txBody>
@@ -3334,17 +3256,22 @@
           <a:lstStyle/>
           <a:p>
             <a:r>
-              <a:t>Diferença entre sinais digitais e analógicos</a:t>
-            </a:r>
-          </a:p>
-          <a:p>
-            <a:r>
-              <a:t>Características dos sinais digitais</a:t>
-            </a:r>
-          </a:p>
-          <a:p>
-            <a:r>
-              <a:t>Vantagens dos sinais digitais</a:t>
+              <a:t>Setor de Saúde: diagnóstico médico, pesquisa de medicamentos</a:t>
+            </a:r>
+          </a:p>
+          <a:p>
+            <a:r>
+              <a:t>Setor Automobilístico: carros autônomos</a:t>
+            </a:r>
+          </a:p>
+          <a:p>
+            <a:r>
+              <a:t>Setor Financeiro: análise de risco, detecção de fraudes</a:t>
+            </a:r>
+          </a:p>
+          <a:p>
+            <a:r>
+              <a:t>Setor de Varejo: recomendação de produtos, atendimento ao cliente</a:t>
             </a:r>
           </a:p>
         </p:txBody>
@@ -3383,7 +3310,7 @@
           <a:lstStyle/>
           <a:p>
             <a:r>
-              <a:t>Sistemas Digitais</a:t>
+              <a:t>Algoritmos de Inteligência Artificial</a:t>
             </a:r>
           </a:p>
         </p:txBody>
@@ -3404,17 +3331,22 @@
           <a:lstStyle/>
           <a:p>
             <a:r>
-              <a:t>Explicação sobre sistemas digitais</a:t>
-            </a:r>
-          </a:p>
-          <a:p>
-            <a:r>
-              <a:t>Exemplos de sistemas digitais comuns (computadores, celulares, etc.)</a:t>
-            </a:r>
-          </a:p>
-          <a:p>
-            <a:r>
-              <a:t>Benefícios dos sistemas digitais</a:t>
+              <a:t>Aprendizado de Máquina (Machine Learning)</a:t>
+            </a:r>
+          </a:p>
+          <a:p>
+            <a:r>
+              <a:t>Redes Neurais Artificiais</a:t>
+            </a:r>
+          </a:p>
+          <a:p>
+            <a:r>
+              <a:t>Processamento de Linguagem Natural</a:t>
+            </a:r>
+          </a:p>
+          <a:p>
+            <a:r>
+              <a:t>Visão Computacional</a:t>
             </a:r>
           </a:p>
         </p:txBody>
@@ -3453,7 +3385,7 @@
           <a:lstStyle/>
           <a:p>
             <a:r>
-              <a:t>Componentes Básicos da Eletrônica Digital</a:t>
+              <a:t>Benefícios e Desafios</a:t>
             </a:r>
           </a:p>
         </p:txBody>
@@ -3474,17 +3406,12 @@
           <a:lstStyle/>
           <a:p>
             <a:r>
-              <a:t>Introdução aos principais componentes da eletrônica digital</a:t>
-            </a:r>
-          </a:p>
-          <a:p>
-            <a:r>
-              <a:t>Tabela com componentes básicos (transistores, diodos, resistores, etc.)</a:t>
-            </a:r>
-          </a:p>
-          <a:p>
-            <a:r>
-              <a:t>Função de cada componente na eletrônica digital</a:t>
+              <a:t>Benefícios: automação de tarefas, aumento da eficiência, criação de soluções inovadoras</a:t>
+            </a:r>
+          </a:p>
+          <a:p>
+            <a:r>
+              <a:t>Desafios: viés nas decisões, falta de transparência, privacidade e segurança dos dados</a:t>
             </a:r>
           </a:p>
         </p:txBody>
@@ -3523,7 +3450,7 @@
           <a:lstStyle/>
           <a:p>
             <a:r>
-              <a:t>Portas Lógicas</a:t>
+              <a:t>Impacto da Inteligência Artificial no Futuro</a:t>
             </a:r>
           </a:p>
         </p:txBody>
@@ -3544,227 +3471,17 @@
           <a:lstStyle/>
           <a:p>
             <a:r>
-              <a:t>Explicação sobre o conceito de portas lógicas</a:t>
-            </a:r>
-          </a:p>
-          <a:p>
-            <a:r>
-              <a:t>Tipos de portas lógicas (AND, OR, NOT, XOR, NAND, NOR)</a:t>
-            </a:r>
-          </a:p>
-          <a:p>
-            <a:r>
-              <a:t>Exemplificação das portas lógicas através de diagramas</a:t>
-            </a:r>
-          </a:p>
-        </p:txBody>
-      </p:sp>
-    </p:spTree>
-  </p:cSld>
-  <p:clrMapOvr>
-    <a:masterClrMapping/>
-  </p:clrMapOvr>
-</p:sld>
-</file>
-
-<file path=ppt/slides/slide7.xml><?xml version="1.0" encoding="utf-8"?>
-<p:sld xmlns:a="http://schemas.openxmlformats.org/drawingml/2006/main" xmlns:p="http://schemas.openxmlformats.org/presentationml/2006/main" xmlns:r="http://schemas.openxmlformats.org/officeDocument/2006/relationships">
-  <p:cSld>
-    <p:spTree>
-      <p:nvGrpSpPr>
-        <p:cNvPr id="1" name=""/>
-        <p:cNvGrpSpPr/>
-        <p:nvPr/>
-      </p:nvGrpSpPr>
-      <p:grpSpPr/>
-      <p:sp>
-        <p:nvSpPr>
-          <p:cNvPr id="2" name="Title 1"/>
-          <p:cNvSpPr>
-            <a:spLocks noGrp="1"/>
-          </p:cNvSpPr>
-          <p:nvPr>
-            <p:ph type="title"/>
-          </p:nvPr>
-        </p:nvSpPr>
-        <p:spPr/>
-        <p:txBody>
-          <a:bodyPr/>
-          <a:lstStyle/>
-          <a:p>
-            <a:r>
-              <a:t>Circuitos Combinacionais</a:t>
-            </a:r>
-          </a:p>
-        </p:txBody>
-      </p:sp>
-      <p:sp>
-        <p:nvSpPr>
-          <p:cNvPr id="3" name="Content Placeholder 2"/>
-          <p:cNvSpPr>
-            <a:spLocks noGrp="1"/>
-          </p:cNvSpPr>
-          <p:nvPr>
-            <p:ph idx="1"/>
-          </p:nvPr>
-        </p:nvSpPr>
-        <p:spPr/>
-        <p:txBody>
-          <a:bodyPr/>
-          <a:lstStyle/>
-          <a:p>
-            <a:r>
-              <a:t>Definição de circuitos combinacionais</a:t>
-            </a:r>
-          </a:p>
-          <a:p>
-            <a:r>
-              <a:t>Exemplos de circuitos combinacionais (decodificadores, multiplexadores, somadores)</a:t>
-            </a:r>
-          </a:p>
-          <a:p>
-            <a:r>
-              <a:t>Utilização de circuitos combinacionais na eletrônica digital</a:t>
-            </a:r>
-          </a:p>
-        </p:txBody>
-      </p:sp>
-    </p:spTree>
-  </p:cSld>
-  <p:clrMapOvr>
-    <a:masterClrMapping/>
-  </p:clrMapOvr>
-</p:sld>
-</file>
-
-<file path=ppt/slides/slide8.xml><?xml version="1.0" encoding="utf-8"?>
-<p:sld xmlns:a="http://schemas.openxmlformats.org/drawingml/2006/main" xmlns:p="http://schemas.openxmlformats.org/presentationml/2006/main" xmlns:r="http://schemas.openxmlformats.org/officeDocument/2006/relationships">
-  <p:cSld>
-    <p:spTree>
-      <p:nvGrpSpPr>
-        <p:cNvPr id="1" name=""/>
-        <p:cNvGrpSpPr/>
-        <p:nvPr/>
-      </p:nvGrpSpPr>
-      <p:grpSpPr/>
-      <p:sp>
-        <p:nvSpPr>
-          <p:cNvPr id="2" name="Title 1"/>
-          <p:cNvSpPr>
-            <a:spLocks noGrp="1"/>
-          </p:cNvSpPr>
-          <p:nvPr>
-            <p:ph type="title"/>
-          </p:nvPr>
-        </p:nvSpPr>
-        <p:spPr/>
-        <p:txBody>
-          <a:bodyPr/>
-          <a:lstStyle/>
-          <a:p>
-            <a:r>
-              <a:t>Circuitos Sequenciais</a:t>
-            </a:r>
-          </a:p>
-        </p:txBody>
-      </p:sp>
-      <p:sp>
-        <p:nvSpPr>
-          <p:cNvPr id="3" name="Content Placeholder 2"/>
-          <p:cNvSpPr>
-            <a:spLocks noGrp="1"/>
-          </p:cNvSpPr>
-          <p:nvPr>
-            <p:ph idx="1"/>
-          </p:nvPr>
-        </p:nvSpPr>
-        <p:spPr/>
-        <p:txBody>
-          <a:bodyPr/>
-          <a:lstStyle/>
-          <a:p>
-            <a:r>
-              <a:t>Explicação sobre circuitos sequenciais</a:t>
-            </a:r>
-          </a:p>
-          <a:p>
-            <a:r>
-              <a:t>Tipos de circuitos sequenciais (flip-flops, contadores, registradores)</a:t>
-            </a:r>
-          </a:p>
-          <a:p>
-            <a:r>
-              <a:t>Aplicações dos circuitos sequenciais</a:t>
-            </a:r>
-          </a:p>
-        </p:txBody>
-      </p:sp>
-    </p:spTree>
-  </p:cSld>
-  <p:clrMapOvr>
-    <a:masterClrMapping/>
-  </p:clrMapOvr>
-</p:sld>
-</file>
-
-<file path=ppt/slides/slide9.xml><?xml version="1.0" encoding="utf-8"?>
-<p:sld xmlns:a="http://schemas.openxmlformats.org/drawingml/2006/main" xmlns:p="http://schemas.openxmlformats.org/presentationml/2006/main" xmlns:r="http://schemas.openxmlformats.org/officeDocument/2006/relationships">
-  <p:cSld>
-    <p:spTree>
-      <p:nvGrpSpPr>
-        <p:cNvPr id="1" name=""/>
-        <p:cNvGrpSpPr/>
-        <p:nvPr/>
-      </p:nvGrpSpPr>
-      <p:grpSpPr/>
-      <p:sp>
-        <p:nvSpPr>
-          <p:cNvPr id="2" name="Title 1"/>
-          <p:cNvSpPr>
-            <a:spLocks noGrp="1"/>
-          </p:cNvSpPr>
-          <p:nvPr>
-            <p:ph type="title"/>
-          </p:nvPr>
-        </p:nvSpPr>
-        <p:spPr/>
-        <p:txBody>
-          <a:bodyPr/>
-          <a:lstStyle/>
-          <a:p>
-            <a:r>
-              <a:t>Microcontroladores</a:t>
-            </a:r>
-          </a:p>
-        </p:txBody>
-      </p:sp>
-      <p:sp>
-        <p:nvSpPr>
-          <p:cNvPr id="3" name="Content Placeholder 2"/>
-          <p:cNvSpPr>
-            <a:spLocks noGrp="1"/>
-          </p:cNvSpPr>
-          <p:nvPr>
-            <p:ph idx="1"/>
-          </p:nvPr>
-        </p:nvSpPr>
-        <p:spPr/>
-        <p:txBody>
-          <a:bodyPr/>
-          <a:lstStyle/>
-          <a:p>
-            <a:r>
-              <a:t>Descrição de microcontroladores</a:t>
-            </a:r>
-          </a:p>
-          <a:p>
-            <a:r>
-              <a:t>Vantagens e aplicações dos microcontroladores</a:t>
-            </a:r>
-          </a:p>
-          <a:p>
-            <a:r>
-              <a:t>Exemplos de microcontroladores famosos (Arduino, PIC, STM32)</a:t>
+              <a:t>Transformação de diversos setores da economia</a:t>
+            </a:r>
+          </a:p>
+          <a:p>
+            <a:r>
+              <a:t>Novos empregos e necessidade de reskilling</a:t>
+            </a:r>
+          </a:p>
+          <a:p>
+            <a:r>
+              <a:t>Adaptação da sociedade à presença da IA</a:t>
             </a:r>
           </a:p>
         </p:txBody>

</xml_diff>

<commit_message>
adicionado api dall-e ao roteiro
</commit_message>
<xml_diff>
--- a/IA/auto_apresentacao_IA.pptx
+++ b/IA/auto_apresentacao_IA.pptx
@@ -11,6 +11,10 @@
     <p:sldId id="259" r:id="rId10"/>
     <p:sldId id="260" r:id="rId11"/>
     <p:sldId id="261" r:id="rId12"/>
+    <p:sldId id="262" r:id="rId13"/>
+    <p:sldId id="263" r:id="rId14"/>
+    <p:sldId id="264" r:id="rId15"/>
+    <p:sldId id="265" r:id="rId16"/>
   </p:sldIdLst>
   <p:sldSz cx="9144000" cy="6858000" type="screen4x3"/>
   <p:notesSz cx="6858000" cy="9144000"/>
@@ -3109,7 +3113,7 @@
           <a:lstStyle/>
           <a:p>
             <a:r>
-              <a:t>Inteligência Artificial</a:t>
+              <a:t>"São João: A festa popular mais animada do Brasil"</a:t>
             </a:r>
           </a:p>
         </p:txBody>
@@ -3130,7 +3134,72 @@
           <a:lstStyle/>
           <a:p>
             <a:r>
-              <a:t>Autor: Kézia</a:t>
+              <a:t>Autor: Luiz Gonzaga</a:t>
+            </a:r>
+          </a:p>
+        </p:txBody>
+      </p:sp>
+    </p:spTree>
+  </p:cSld>
+  <p:clrMapOvr>
+    <a:masterClrMapping/>
+  </p:clrMapOvr>
+</p:sld>
+</file>
+
+<file path=ppt/slides/slide10.xml><?xml version="1.0" encoding="utf-8"?>
+<p:sld xmlns:a="http://schemas.openxmlformats.org/drawingml/2006/main" xmlns:p="http://schemas.openxmlformats.org/presentationml/2006/main" xmlns:r="http://schemas.openxmlformats.org/officeDocument/2006/relationships">
+  <p:cSld>
+    <p:spTree>
+      <p:nvGrpSpPr>
+        <p:cNvPr id="1" name=""/>
+        <p:cNvGrpSpPr/>
+        <p:nvPr/>
+      </p:nvGrpSpPr>
+      <p:grpSpPr/>
+      <p:sp>
+        <p:nvSpPr>
+          <p:cNvPr id="2" name="Title 1"/>
+          <p:cNvSpPr>
+            <a:spLocks noGrp="1"/>
+          </p:cNvSpPr>
+          <p:nvPr>
+            <p:ph type="title"/>
+          </p:nvPr>
+        </p:nvSpPr>
+        <p:spPr/>
+        <p:txBody>
+          <a:bodyPr/>
+          <a:lstStyle/>
+          <a:p>
+            <a:r>
+              <a:t>Conclusão</a:t>
+            </a:r>
+          </a:p>
+        </p:txBody>
+      </p:sp>
+      <p:sp>
+        <p:nvSpPr>
+          <p:cNvPr id="3" name="Content Placeholder 2"/>
+          <p:cNvSpPr>
+            <a:spLocks noGrp="1"/>
+          </p:cNvSpPr>
+          <p:nvPr>
+            <p:ph idx="1"/>
+          </p:nvPr>
+        </p:nvSpPr>
+        <p:spPr/>
+        <p:txBody>
+          <a:bodyPr/>
+          <a:lstStyle/>
+          <a:p>
+            <a:r>
+              <a:t>Celebração da festa de São João como parte importante da cultura brasileira</a:t>
+            </a:r>
+          </a:p>
+          <a:p>
+            <a:r>
+              <a:t>A importância de manter viva a tradição das festas juninas em todo o país</a:t>
             </a:r>
           </a:p>
         </p:txBody>
@@ -3169,7 +3238,7 @@
           <a:lstStyle/>
           <a:p>
             <a:r>
-              <a:t>O que é Inteligência Artificial?</a:t>
+              <a:t>Origem da festa de São João</a:t>
             </a:r>
           </a:p>
         </p:txBody>
@@ -3188,15 +3257,14 @@
         <p:txBody>
           <a:bodyPr/>
           <a:lstStyle/>
-          <a:p/>
-          <a:p>
-            <a:r>
-              <a:t>Definição de Inteligência Artificial</a:t>
-            </a:r>
-          </a:p>
-          <a:p>
-            <a:r>
-              <a:t>Capacidade de simular o pensamento humano através de algoritmos e sistemas computacionais</a:t>
+          <a:p>
+            <a:r>
+              <a:t>Explicação sobre a origem da festa de São João</a:t>
+            </a:r>
+          </a:p>
+          <a:p>
+            <a:r>
+              <a:t>Influência das tradições europeias e indígenas</a:t>
             </a:r>
           </a:p>
         </p:txBody>
@@ -3235,7 +3303,7 @@
           <a:lstStyle/>
           <a:p>
             <a:r>
-              <a:t>Aplicações da Inteligência Artificial</a:t>
+              <a:t>radições e símbolos de São João</a:t>
             </a:r>
           </a:p>
         </p:txBody>
@@ -3256,22 +3324,22 @@
           <a:lstStyle/>
           <a:p>
             <a:r>
-              <a:t>Setor de Saúde: diagnóstico médico, pesquisa de medicamentos</a:t>
-            </a:r>
-          </a:p>
-          <a:p>
-            <a:r>
-              <a:t>Setor Automobilístico: carros autônomos</a:t>
-            </a:r>
-          </a:p>
-          <a:p>
-            <a:r>
-              <a:t>Setor Financeiro: análise de risco, detecção de fraudes</a:t>
-            </a:r>
-          </a:p>
-          <a:p>
-            <a:r>
-              <a:t>Setor de Varejo: recomendação de produtos, atendimento ao cliente</a:t>
+              <a:t>Fogueiras</a:t>
+            </a:r>
+          </a:p>
+          <a:p>
+            <a:r>
+              <a:t>Quadrilhas</a:t>
+            </a:r>
+          </a:p>
+          <a:p>
+            <a:r>
+              <a:t>Comidas típicas (milho, canjica, pé de moleque)</a:t>
+            </a:r>
+          </a:p>
+          <a:p>
+            <a:r>
+              <a:t>Bandeirinhas coloridas</a:t>
             </a:r>
           </a:p>
         </p:txBody>
@@ -3310,7 +3378,7 @@
           <a:lstStyle/>
           <a:p>
             <a:r>
-              <a:t>Algoritmos de Inteligência Artificial</a:t>
+              <a:t>O papel da música de Luiz Gonzaga na festa de São João</a:t>
             </a:r>
           </a:p>
         </p:txBody>
@@ -3331,22 +3399,12 @@
           <a:lstStyle/>
           <a:p>
             <a:r>
-              <a:t>Aprendizado de Máquina (Machine Learning)</a:t>
-            </a:r>
-          </a:p>
-          <a:p>
-            <a:r>
-              <a:t>Redes Neurais Artificiais</a:t>
-            </a:r>
-          </a:p>
-          <a:p>
-            <a:r>
-              <a:t>Processamento de Linguagem Natural</a:t>
-            </a:r>
-          </a:p>
-          <a:p>
-            <a:r>
-              <a:t>Visão Computacional</a:t>
+              <a:t>Importância das músicas de Luiz Gonzaga na celebração</a:t>
+            </a:r>
+          </a:p>
+          <a:p>
+            <a:r>
+              <a:t>Principais sucessos do "Rei do Baião" para animar a festa</a:t>
             </a:r>
           </a:p>
         </p:txBody>
@@ -3385,7 +3443,7 @@
           <a:lstStyle/>
           <a:p>
             <a:r>
-              <a:t>Benefícios e Desafios</a:t>
+              <a:t>Festas de São João pelo Brasil</a:t>
             </a:r>
           </a:p>
         </p:txBody>
@@ -3406,12 +3464,12 @@
           <a:lstStyle/>
           <a:p>
             <a:r>
-              <a:t>Benefícios: automação de tarefas, aumento da eficiência, criação de soluções inovadoras</a:t>
-            </a:r>
-          </a:p>
-          <a:p>
-            <a:r>
-              <a:t>Desafios: viés nas decisões, falta de transparência, privacidade e segurança dos dados</a:t>
+              <a:t>Diferentes formas de celebrar o São João em todo o país</a:t>
+            </a:r>
+          </a:p>
+          <a:p>
+            <a:r>
+              <a:t>Destaques para as festas de Campina Grande, Caruaru e outras regiões</a:t>
             </a:r>
           </a:p>
         </p:txBody>
@@ -3450,7 +3508,7 @@
           <a:lstStyle/>
           <a:p>
             <a:r>
-              <a:t>Impacto da Inteligência Artificial no Futuro</a:t>
+              <a:t>São João para todas as idades</a:t>
             </a:r>
           </a:p>
         </p:txBody>
@@ -3471,17 +3529,212 @@
           <a:lstStyle/>
           <a:p>
             <a:r>
-              <a:t>Transformação de diversos setores da economia</a:t>
-            </a:r>
-          </a:p>
-          <a:p>
-            <a:r>
-              <a:t>Novos empregos e necessidade de reskilling</a:t>
-            </a:r>
-          </a:p>
-          <a:p>
-            <a:r>
-              <a:t>Adaptação da sociedade à presença da IA</a:t>
+              <a:t>Atividades para crianças</a:t>
+            </a:r>
+          </a:p>
+          <a:p>
+            <a:r>
+              <a:t>Festejos para os jovens</a:t>
+            </a:r>
+          </a:p>
+          <a:p>
+            <a:r>
+              <a:t>Programação para os idosos</a:t>
+            </a:r>
+          </a:p>
+        </p:txBody>
+      </p:sp>
+    </p:spTree>
+  </p:cSld>
+  <p:clrMapOvr>
+    <a:masterClrMapping/>
+  </p:clrMapOvr>
+</p:sld>
+</file>
+
+<file path=ppt/slides/slide7.xml><?xml version="1.0" encoding="utf-8"?>
+<p:sld xmlns:a="http://schemas.openxmlformats.org/drawingml/2006/main" xmlns:p="http://schemas.openxmlformats.org/presentationml/2006/main" xmlns:r="http://schemas.openxmlformats.org/officeDocument/2006/relationships">
+  <p:cSld>
+    <p:spTree>
+      <p:nvGrpSpPr>
+        <p:cNvPr id="1" name=""/>
+        <p:cNvGrpSpPr/>
+        <p:nvPr/>
+      </p:nvGrpSpPr>
+      <p:grpSpPr/>
+      <p:sp>
+        <p:nvSpPr>
+          <p:cNvPr id="2" name="Title 1"/>
+          <p:cNvSpPr>
+            <a:spLocks noGrp="1"/>
+          </p:cNvSpPr>
+          <p:nvPr>
+            <p:ph type="title"/>
+          </p:nvPr>
+        </p:nvSpPr>
+        <p:spPr/>
+        <p:txBody>
+          <a:bodyPr/>
+          <a:lstStyle/>
+          <a:p>
+            <a:r>
+              <a:t>São João: Economia e turismo</a:t>
+            </a:r>
+          </a:p>
+        </p:txBody>
+      </p:sp>
+      <p:sp>
+        <p:nvSpPr>
+          <p:cNvPr id="3" name="Content Placeholder 2"/>
+          <p:cNvSpPr>
+            <a:spLocks noGrp="1"/>
+          </p:cNvSpPr>
+          <p:nvPr>
+            <p:ph idx="1"/>
+          </p:nvPr>
+        </p:nvSpPr>
+        <p:spPr/>
+        <p:txBody>
+          <a:bodyPr/>
+          <a:lstStyle/>
+          <a:p>
+            <a:r>
+              <a:t>Impacto econômico da festa de São João</a:t>
+            </a:r>
+          </a:p>
+          <a:p>
+            <a:r>
+              <a:t>Atrativos turísticos durante as festas juninas</a:t>
+            </a:r>
+          </a:p>
+        </p:txBody>
+      </p:sp>
+    </p:spTree>
+  </p:cSld>
+  <p:clrMapOvr>
+    <a:masterClrMapping/>
+  </p:clrMapOvr>
+</p:sld>
+</file>
+
+<file path=ppt/slides/slide8.xml><?xml version="1.0" encoding="utf-8"?>
+<p:sld xmlns:a="http://schemas.openxmlformats.org/drawingml/2006/main" xmlns:p="http://schemas.openxmlformats.org/presentationml/2006/main" xmlns:r="http://schemas.openxmlformats.org/officeDocument/2006/relationships">
+  <p:cSld>
+    <p:spTree>
+      <p:nvGrpSpPr>
+        <p:cNvPr id="1" name=""/>
+        <p:cNvGrpSpPr/>
+        <p:nvPr/>
+      </p:nvGrpSpPr>
+      <p:grpSpPr/>
+      <p:sp>
+        <p:nvSpPr>
+          <p:cNvPr id="2" name="Title 1"/>
+          <p:cNvSpPr>
+            <a:spLocks noGrp="1"/>
+          </p:cNvSpPr>
+          <p:nvPr>
+            <p:ph type="title"/>
+          </p:nvPr>
+        </p:nvSpPr>
+        <p:spPr/>
+        <p:txBody>
+          <a:bodyPr/>
+          <a:lstStyle/>
+          <a:p>
+            <a:r>
+              <a:t>São João e as manifestações culturais</a:t>
+            </a:r>
+          </a:p>
+        </p:txBody>
+      </p:sp>
+      <p:sp>
+        <p:nvSpPr>
+          <p:cNvPr id="3" name="Content Placeholder 2"/>
+          <p:cNvSpPr>
+            <a:spLocks noGrp="1"/>
+          </p:cNvSpPr>
+          <p:nvPr>
+            <p:ph idx="1"/>
+          </p:nvPr>
+        </p:nvSpPr>
+        <p:spPr/>
+        <p:txBody>
+          <a:bodyPr/>
+          <a:lstStyle/>
+          <a:p>
+            <a:r>
+              <a:t>Relação entre São João e as culturas regionais do Brasil</a:t>
+            </a:r>
+          </a:p>
+          <a:p>
+            <a:r>
+              <a:t>Diversidade de manifestações culturais durante as festas juninas</a:t>
+            </a:r>
+          </a:p>
+        </p:txBody>
+      </p:sp>
+    </p:spTree>
+  </p:cSld>
+  <p:clrMapOvr>
+    <a:masterClrMapping/>
+  </p:clrMapOvr>
+</p:sld>
+</file>
+
+<file path=ppt/slides/slide9.xml><?xml version="1.0" encoding="utf-8"?>
+<p:sld xmlns:a="http://schemas.openxmlformats.org/drawingml/2006/main" xmlns:p="http://schemas.openxmlformats.org/presentationml/2006/main" xmlns:r="http://schemas.openxmlformats.org/officeDocument/2006/relationships">
+  <p:cSld>
+    <p:spTree>
+      <p:nvGrpSpPr>
+        <p:cNvPr id="1" name=""/>
+        <p:cNvGrpSpPr/>
+        <p:nvPr/>
+      </p:nvGrpSpPr>
+      <p:grpSpPr/>
+      <p:sp>
+        <p:nvSpPr>
+          <p:cNvPr id="2" name="Title 1"/>
+          <p:cNvSpPr>
+            <a:spLocks noGrp="1"/>
+          </p:cNvSpPr>
+          <p:nvPr>
+            <p:ph type="title"/>
+          </p:nvPr>
+        </p:nvSpPr>
+        <p:spPr/>
+        <p:txBody>
+          <a:bodyPr/>
+          <a:lstStyle/>
+          <a:p>
+            <a:r>
+              <a:t>Importância da preservação das tradições de São João</a:t>
+            </a:r>
+          </a:p>
+        </p:txBody>
+      </p:sp>
+      <p:sp>
+        <p:nvSpPr>
+          <p:cNvPr id="3" name="Content Placeholder 2"/>
+          <p:cNvSpPr>
+            <a:spLocks noGrp="1"/>
+          </p:cNvSpPr>
+          <p:nvPr>
+            <p:ph idx="1"/>
+          </p:nvPr>
+        </p:nvSpPr>
+        <p:spPr/>
+        <p:txBody>
+          <a:bodyPr/>
+          <a:lstStyle/>
+          <a:p>
+            <a:r>
+              <a:t>Necessidade de preservar as tradições juninas</a:t>
+            </a:r>
+          </a:p>
+          <a:p>
+            <a:r>
+              <a:t>Valorização da cultura popular e das festas típicas</a:t>
             </a:r>
           </a:p>
         </p:txBody>

</xml_diff>

<commit_message>
resolvido o problema da falta do rotulo titulo
</commit_message>
<xml_diff>
--- a/IA/auto_apresentacao_IA.pptx
+++ b/IA/auto_apresentacao_IA.pptx
@@ -3113,7 +3113,7 @@
           <a:lstStyle/>
           <a:p>
             <a:r>
-              <a:t>"São João: A festa popular mais animada do Brasil"</a:t>
+              <a:t>Robótica</a:t>
             </a:r>
           </a:p>
         </p:txBody>
@@ -3134,7 +3134,7 @@
           <a:lstStyle/>
           <a:p>
             <a:r>
-              <a:t>Autor: Luiz Gonzaga</a:t>
+              <a:t>Autor: Rei Robô</a:t>
             </a:r>
           </a:p>
         </p:txBody>
@@ -3194,12 +3194,7 @@
           <a:lstStyle/>
           <a:p>
             <a:r>
-              <a:t>Celebração da festa de São João como parte importante da cultura brasileira</a:t>
-            </a:r>
-          </a:p>
-          <a:p>
-            <a:r>
-              <a:t>A importância de manter viva a tradição das festas juninas em todo o país</a:t>
+              <a:t>A robótica é uma área em constante evolução, com aplicações em diversas áreas e um potencial de transformação da sociedade. É importante considerar os desafios éticos e sociais relacionados à utilização de robôs, buscando sempre um equilíbrio entre inovação e responsabilidade. A robótica continuará a desempenhar um papel fundamental no futuro, criando novas possibilidades e desafios para a humanidade.</a:t>
             </a:r>
           </a:p>
         </p:txBody>
@@ -3238,7 +3233,7 @@
           <a:lstStyle/>
           <a:p>
             <a:r>
-              <a:t>Origem da festa de São João</a:t>
+              <a:t>Introdução à Robótica</a:t>
             </a:r>
           </a:p>
         </p:txBody>
@@ -3259,12 +3254,17 @@
           <a:lstStyle/>
           <a:p>
             <a:r>
-              <a:t>Explicação sobre a origem da festa de São João</a:t>
-            </a:r>
-          </a:p>
-          <a:p>
-            <a:r>
-              <a:t>Influência das tradições europeias e indígenas</a:t>
+              <a:t>Definição de Robótica</a:t>
+            </a:r>
+          </a:p>
+          <a:p>
+            <a:r>
+              <a:t>História da Robótica</a:t>
+            </a:r>
+          </a:p>
+          <a:p>
+            <a:r>
+              <a:t>Aplicações da Robótica</a:t>
             </a:r>
           </a:p>
         </p:txBody>
@@ -3303,7 +3303,7 @@
           <a:lstStyle/>
           <a:p>
             <a:r>
-              <a:t>radições e símbolos de São João</a:t>
+              <a:t>Componentes de um Robô</a:t>
             </a:r>
           </a:p>
         </p:txBody>
@@ -3324,22 +3324,17 @@
           <a:lstStyle/>
           <a:p>
             <a:r>
-              <a:t>Fogueiras</a:t>
-            </a:r>
-          </a:p>
-          <a:p>
-            <a:r>
-              <a:t>Quadrilhas</a:t>
-            </a:r>
-          </a:p>
-          <a:p>
-            <a:r>
-              <a:t>Comidas típicas (milho, canjica, pé de moleque)</a:t>
-            </a:r>
-          </a:p>
-          <a:p>
-            <a:r>
-              <a:t>Bandeirinhas coloridas</a:t>
+              <a:t>Sensores</a:t>
+            </a:r>
+          </a:p>
+          <a:p>
+            <a:r>
+              <a:t>Atuadores</a:t>
+            </a:r>
+          </a:p>
+          <a:p>
+            <a:r>
+              <a:t>Controladores</a:t>
             </a:r>
           </a:p>
         </p:txBody>
@@ -3378,7 +3373,7 @@
           <a:lstStyle/>
           <a:p>
             <a:r>
-              <a:t>O papel da música de Luiz Gonzaga na festa de São João</a:t>
+              <a:t>ipos de Robôs</a:t>
             </a:r>
           </a:p>
         </p:txBody>
@@ -3399,12 +3394,22 @@
           <a:lstStyle/>
           <a:p>
             <a:r>
-              <a:t>Importância das músicas de Luiz Gonzaga na celebração</a:t>
-            </a:r>
-          </a:p>
-          <a:p>
-            <a:r>
-              <a:t>Principais sucessos do "Rei do Baião" para animar a festa</a:t>
+              <a:t>Robôs Industriais</a:t>
+            </a:r>
+          </a:p>
+          <a:p>
+            <a:r>
+              <a:t>Robôs Móveis</a:t>
+            </a:r>
+          </a:p>
+          <a:p>
+            <a:r>
+              <a:t>Robôs Autônomos</a:t>
+            </a:r>
+          </a:p>
+          <a:p>
+            <a:r>
+              <a:t>Robôs Colaborativos</a:t>
             </a:r>
           </a:p>
         </p:txBody>
@@ -3443,7 +3448,7 @@
           <a:lstStyle/>
           <a:p>
             <a:r>
-              <a:t>Festas de São João pelo Brasil</a:t>
+              <a:t>Aplicações da Robótica</a:t>
             </a:r>
           </a:p>
         </p:txBody>
@@ -3464,12 +3469,22 @@
           <a:lstStyle/>
           <a:p>
             <a:r>
-              <a:t>Diferentes formas de celebrar o São João em todo o país</a:t>
-            </a:r>
-          </a:p>
-          <a:p>
-            <a:r>
-              <a:t>Destaques para as festas de Campina Grande, Caruaru e outras regiões</a:t>
+              <a:t>Linha de produção automatizada</a:t>
+            </a:r>
+          </a:p>
+          <a:p>
+            <a:r>
+              <a:t>Robôs cirúrgicos</a:t>
+            </a:r>
+          </a:p>
+          <a:p>
+            <a:r>
+              <a:t>Robôs de exploração espacial</a:t>
+            </a:r>
+          </a:p>
+          <a:p>
+            <a:r>
+              <a:t>Robôs de entretenimento</a:t>
             </a:r>
           </a:p>
         </p:txBody>
@@ -3508,7 +3523,7 @@
           <a:lstStyle/>
           <a:p>
             <a:r>
-              <a:t>São João para todas as idades</a:t>
+              <a:t>Robótica e Inteligência Artificial</a:t>
             </a:r>
           </a:p>
         </p:txBody>
@@ -3529,17 +3544,17 @@
           <a:lstStyle/>
           <a:p>
             <a:r>
-              <a:t>Atividades para crianças</a:t>
-            </a:r>
-          </a:p>
-          <a:p>
-            <a:r>
-              <a:t>Festejos para os jovens</a:t>
-            </a:r>
-          </a:p>
-          <a:p>
-            <a:r>
-              <a:t>Programação para os idosos</a:t>
+              <a:t>Integração de IA nos robôs</a:t>
+            </a:r>
+          </a:p>
+          <a:p>
+            <a:r>
+              <a:t>Aprendizado de Máquina</a:t>
+            </a:r>
+          </a:p>
+          <a:p>
+            <a:r>
+              <a:t>Robôs autônomos</a:t>
             </a:r>
           </a:p>
         </p:txBody>
@@ -3578,7 +3593,7 @@
           <a:lstStyle/>
           <a:p>
             <a:r>
-              <a:t>São João: Economia e turismo</a:t>
+              <a:t>Ética na Robótica</a:t>
             </a:r>
           </a:p>
         </p:txBody>
@@ -3599,12 +3614,17 @@
           <a:lstStyle/>
           <a:p>
             <a:r>
-              <a:t>Impacto econômico da festa de São João</a:t>
-            </a:r>
-          </a:p>
-          <a:p>
-            <a:r>
-              <a:t>Atrativos turísticos durante as festas juninas</a:t>
+              <a:t>Questões éticas em relação à autonomia dos robôs</a:t>
+            </a:r>
+          </a:p>
+          <a:p>
+            <a:r>
+              <a:t>Impacto social e econômico dos robôs</a:t>
+            </a:r>
+          </a:p>
+          <a:p>
+            <a:r>
+              <a:t>Responsabilidade e accountability na utilização de robôs</a:t>
             </a:r>
           </a:p>
         </p:txBody>
@@ -3643,7 +3663,7 @@
           <a:lstStyle/>
           <a:p>
             <a:r>
-              <a:t>São João e as manifestações culturais</a:t>
+              <a:t>Desafios da Robótica</a:t>
             </a:r>
           </a:p>
         </p:txBody>
@@ -3664,12 +3684,17 @@
           <a:lstStyle/>
           <a:p>
             <a:r>
-              <a:t>Relação entre São João e as culturas regionais do Brasil</a:t>
-            </a:r>
-          </a:p>
-          <a:p>
-            <a:r>
-              <a:t>Diversidade de manifestações culturais durante as festas juninas</a:t>
+              <a:t>Manipulação de objetos complexos</a:t>
+            </a:r>
+          </a:p>
+          <a:p>
+            <a:r>
+              <a:t>Navegação autônoma em ambientes dinâmicos</a:t>
+            </a:r>
+          </a:p>
+          <a:p>
+            <a:r>
+              <a:t>Interpretação e execução de comandos humanos</a:t>
             </a:r>
           </a:p>
         </p:txBody>
@@ -3708,7 +3733,7 @@
           <a:lstStyle/>
           <a:p>
             <a:r>
-              <a:t>Importância da preservação das tradições de São João</a:t>
+              <a:t>Futuro da Robótica</a:t>
             </a:r>
           </a:p>
         </p:txBody>
@@ -3729,12 +3754,17 @@
           <a:lstStyle/>
           <a:p>
             <a:r>
-              <a:t>Necessidade de preservar as tradições juninas</a:t>
-            </a:r>
-          </a:p>
-          <a:p>
-            <a:r>
-              <a:t>Valorização da cultura popular e das festas típicas</a:t>
+              <a:t>Avanços tecnológicos</a:t>
+            </a:r>
+          </a:p>
+          <a:p>
+            <a:r>
+              <a:t>Integração cada vez maior de robôs na sociedade</a:t>
+            </a:r>
+          </a:p>
+          <a:p>
+            <a:r>
+              <a:t>Novas aplicações da robótica</a:t>
             </a:r>
           </a:p>
         </p:txBody>

</xml_diff>

<commit_message>
corrigida versão automatizada. falta inserir imagens automaticamente
</commit_message>
<xml_diff>
--- a/IA/auto_apresentacao_IA.pptx
+++ b/IA/auto_apresentacao_IA.pptx
@@ -15,6 +15,12 @@
     <p:sldId id="263" r:id="rId14"/>
     <p:sldId id="264" r:id="rId15"/>
     <p:sldId id="265" r:id="rId16"/>
+    <p:sldId id="266" r:id="rId17"/>
+    <p:sldId id="267" r:id="rId18"/>
+    <p:sldId id="268" r:id="rId19"/>
+    <p:sldId id="269" r:id="rId20"/>
+    <p:sldId id="270" r:id="rId21"/>
+    <p:sldId id="271" r:id="rId22"/>
   </p:sldIdLst>
   <p:sldSz cx="9144000" cy="6858000" type="screen4x3"/>
   <p:notesSz cx="6858000" cy="9144000"/>
@@ -3113,7 +3119,7 @@
           <a:lstStyle/>
           <a:p>
             <a:r>
-              <a:t>Robótica</a:t>
+              <a:t>Compiladores</a:t>
             </a:r>
           </a:p>
         </p:txBody>
@@ -3134,7 +3140,7 @@
           <a:lstStyle/>
           <a:p>
             <a:r>
-              <a:t>Autor: Rei Robô</a:t>
+              <a:t>Autor: Kézia Vasconcelos</a:t>
             </a:r>
           </a:p>
         </p:txBody>
@@ -3173,6 +3179,286 @@
           <a:lstStyle/>
           <a:p>
             <a:r>
+              <a:t>Exemplos de compiladores</a:t>
+            </a:r>
+          </a:p>
+        </p:txBody>
+      </p:sp>
+      <p:sp>
+        <p:nvSpPr>
+          <p:cNvPr id="3" name="Content Placeholder 2"/>
+          <p:cNvSpPr>
+            <a:spLocks noGrp="1"/>
+          </p:cNvSpPr>
+          <p:nvPr>
+            <p:ph idx="1"/>
+          </p:nvPr>
+        </p:nvSpPr>
+        <p:spPr/>
+        <p:txBody>
+          <a:bodyPr/>
+          <a:lstStyle/>
+          <a:p>
+            <a:r>
+              <a:t>GCC (GNU Compiler Collection)</a:t>
+            </a:r>
+          </a:p>
+          <a:p>
+            <a:r>
+              <a:t>Clang</a:t>
+            </a:r>
+          </a:p>
+          <a:p>
+            <a:r>
+              <a:t>Visual Studio Compiler</a:t>
+            </a:r>
+          </a:p>
+        </p:txBody>
+      </p:sp>
+    </p:spTree>
+  </p:cSld>
+  <p:clrMapOvr>
+    <a:masterClrMapping/>
+  </p:clrMapOvr>
+</p:sld>
+</file>
+
+<file path=ppt/slides/slide11.xml><?xml version="1.0" encoding="utf-8"?>
+<p:sld xmlns:a="http://schemas.openxmlformats.org/drawingml/2006/main" xmlns:p="http://schemas.openxmlformats.org/presentationml/2006/main" xmlns:r="http://schemas.openxmlformats.org/officeDocument/2006/relationships">
+  <p:cSld>
+    <p:spTree>
+      <p:nvGrpSpPr>
+        <p:cNvPr id="1" name=""/>
+        <p:cNvGrpSpPr/>
+        <p:nvPr/>
+      </p:nvGrpSpPr>
+      <p:grpSpPr/>
+      <p:sp>
+        <p:nvSpPr>
+          <p:cNvPr id="2" name="Title 1"/>
+          <p:cNvSpPr>
+            <a:spLocks noGrp="1"/>
+          </p:cNvSpPr>
+          <p:nvPr>
+            <p:ph type="title"/>
+          </p:nvPr>
+        </p:nvSpPr>
+        <p:spPr/>
+        <p:txBody>
+          <a:bodyPr/>
+          <a:lstStyle/>
+          <a:p>
+            <a:r>
+              <a:t>Ferramentas auxiliares</a:t>
+            </a:r>
+          </a:p>
+        </p:txBody>
+      </p:sp>
+      <p:sp>
+        <p:nvSpPr>
+          <p:cNvPr id="3" name="Content Placeholder 2"/>
+          <p:cNvSpPr>
+            <a:spLocks noGrp="1"/>
+          </p:cNvSpPr>
+          <p:nvPr>
+            <p:ph idx="1"/>
+          </p:nvPr>
+        </p:nvSpPr>
+        <p:spPr/>
+        <p:txBody>
+          <a:bodyPr/>
+          <a:lstStyle/>
+          <a:p>
+            <a:r>
+              <a:t>IDEs (Ambientes de Desenvolvimento Integrado)</a:t>
+            </a:r>
+          </a:p>
+          <a:p>
+            <a:r>
+              <a:t>Depuradores (debuggers)</a:t>
+            </a:r>
+          </a:p>
+          <a:p>
+            <a:r>
+              <a:t>Perfis de desempenho (profilers)</a:t>
+            </a:r>
+          </a:p>
+        </p:txBody>
+      </p:sp>
+    </p:spTree>
+  </p:cSld>
+  <p:clrMapOvr>
+    <a:masterClrMapping/>
+  </p:clrMapOvr>
+</p:sld>
+</file>
+
+<file path=ppt/slides/slide12.xml><?xml version="1.0" encoding="utf-8"?>
+<p:sld xmlns:a="http://schemas.openxmlformats.org/drawingml/2006/main" xmlns:p="http://schemas.openxmlformats.org/presentationml/2006/main" xmlns:r="http://schemas.openxmlformats.org/officeDocument/2006/relationships">
+  <p:cSld>
+    <p:spTree>
+      <p:nvGrpSpPr>
+        <p:cNvPr id="1" name=""/>
+        <p:cNvGrpSpPr/>
+        <p:nvPr/>
+      </p:nvGrpSpPr>
+      <p:grpSpPr/>
+      <p:sp>
+        <p:nvSpPr>
+          <p:cNvPr id="2" name="Title 1"/>
+          <p:cNvSpPr>
+            <a:spLocks noGrp="1"/>
+          </p:cNvSpPr>
+          <p:nvPr>
+            <p:ph type="title"/>
+          </p:nvPr>
+        </p:nvSpPr>
+        <p:spPr/>
+        <p:txBody>
+          <a:bodyPr/>
+          <a:lstStyle/>
+          <a:p>
+            <a:r>
+              <a:t>Desafios na construção de compiladores</a:t>
+            </a:r>
+          </a:p>
+        </p:txBody>
+      </p:sp>
+      <p:sp>
+        <p:nvSpPr>
+          <p:cNvPr id="3" name="Content Placeholder 2"/>
+          <p:cNvSpPr>
+            <a:spLocks noGrp="1"/>
+          </p:cNvSpPr>
+          <p:nvPr>
+            <p:ph idx="1"/>
+          </p:nvPr>
+        </p:nvSpPr>
+        <p:spPr/>
+        <p:txBody>
+          <a:bodyPr/>
+          <a:lstStyle/>
+          <a:p>
+            <a:r>
+              <a:t>Lidar com ambiguidades na linguagem</a:t>
+            </a:r>
+          </a:p>
+          <a:p>
+            <a:r>
+              <a:t>Otimização de código eficiente</a:t>
+            </a:r>
+          </a:p>
+          <a:p>
+            <a:r>
+              <a:t>Suporte a múltiplas plataformas</a:t>
+            </a:r>
+          </a:p>
+        </p:txBody>
+      </p:sp>
+    </p:spTree>
+  </p:cSld>
+  <p:clrMapOvr>
+    <a:masterClrMapping/>
+  </p:clrMapOvr>
+</p:sld>
+</file>
+
+<file path=ppt/slides/slide13.xml><?xml version="1.0" encoding="utf-8"?>
+<p:sld xmlns:a="http://schemas.openxmlformats.org/drawingml/2006/main" xmlns:p="http://schemas.openxmlformats.org/presentationml/2006/main" xmlns:r="http://schemas.openxmlformats.org/officeDocument/2006/relationships">
+  <p:cSld>
+    <p:spTree>
+      <p:nvGrpSpPr>
+        <p:cNvPr id="1" name=""/>
+        <p:cNvGrpSpPr/>
+        <p:nvPr/>
+      </p:nvGrpSpPr>
+      <p:grpSpPr/>
+      <p:sp>
+        <p:nvSpPr>
+          <p:cNvPr id="2" name="Title 1"/>
+          <p:cNvSpPr>
+            <a:spLocks noGrp="1"/>
+          </p:cNvSpPr>
+          <p:nvPr>
+            <p:ph type="title"/>
+          </p:nvPr>
+        </p:nvSpPr>
+        <p:spPr/>
+        <p:txBody>
+          <a:bodyPr/>
+          <a:lstStyle/>
+          <a:p>
+            <a:r>
+              <a:t>Futuro dos compiladores</a:t>
+            </a:r>
+          </a:p>
+        </p:txBody>
+      </p:sp>
+      <p:sp>
+        <p:nvSpPr>
+          <p:cNvPr id="3" name="Content Placeholder 2"/>
+          <p:cNvSpPr>
+            <a:spLocks noGrp="1"/>
+          </p:cNvSpPr>
+          <p:nvPr>
+            <p:ph idx="1"/>
+          </p:nvPr>
+        </p:nvSpPr>
+        <p:spPr/>
+        <p:txBody>
+          <a:bodyPr/>
+          <a:lstStyle/>
+          <a:p>
+            <a:r>
+              <a:t>Avanços em otimização de código</a:t>
+            </a:r>
+          </a:p>
+          <a:p>
+            <a:r>
+              <a:t>Aumento da integração com IDEs</a:t>
+            </a:r>
+          </a:p>
+          <a:p>
+            <a:r>
+              <a:t>Suporte a novas linguagens de programação</a:t>
+            </a:r>
+          </a:p>
+        </p:txBody>
+      </p:sp>
+    </p:spTree>
+  </p:cSld>
+  <p:clrMapOvr>
+    <a:masterClrMapping/>
+  </p:clrMapOvr>
+</p:sld>
+</file>
+
+<file path=ppt/slides/slide14.xml><?xml version="1.0" encoding="utf-8"?>
+<p:sld xmlns:a="http://schemas.openxmlformats.org/drawingml/2006/main" xmlns:p="http://schemas.openxmlformats.org/presentationml/2006/main" xmlns:r="http://schemas.openxmlformats.org/officeDocument/2006/relationships">
+  <p:cSld>
+    <p:spTree>
+      <p:nvGrpSpPr>
+        <p:cNvPr id="1" name=""/>
+        <p:cNvGrpSpPr/>
+        <p:nvPr/>
+      </p:nvGrpSpPr>
+      <p:grpSpPr/>
+      <p:sp>
+        <p:nvSpPr>
+          <p:cNvPr id="2" name="Title 1"/>
+          <p:cNvSpPr>
+            <a:spLocks noGrp="1"/>
+          </p:cNvSpPr>
+          <p:nvPr>
+            <p:ph type="title"/>
+          </p:nvPr>
+        </p:nvSpPr>
+        <p:spPr/>
+        <p:txBody>
+          <a:bodyPr/>
+          <a:lstStyle/>
+          <a:p>
+            <a:r>
               <a:t>Conclusão</a:t>
             </a:r>
           </a:p>
@@ -3194,7 +3480,157 @@
           <a:lstStyle/>
           <a:p>
             <a:r>
-              <a:t>A robótica é uma área em constante evolução, com aplicações em diversas áreas e um potencial de transformação da sociedade. É importante considerar os desafios éticos e sociais relacionados à utilização de robôs, buscando sempre um equilíbrio entre inovação e responsabilidade. A robótica continuará a desempenhar um papel fundamental no futuro, criando novas possibilidades e desafios para a humanidade.</a:t>
+              <a:t>Compiladores desempenham papel fundamental na programação</a:t>
+            </a:r>
+          </a:p>
+          <a:p>
+            <a:r>
+              <a:t>Processo de compilação é complexo e exige várias etapas</a:t>
+            </a:r>
+          </a:p>
+          <a:p>
+            <a:r>
+              <a:t>Importância de conhecer o funcionamento dos compiladores para programadores</a:t>
+            </a:r>
+          </a:p>
+        </p:txBody>
+      </p:sp>
+    </p:spTree>
+  </p:cSld>
+  <p:clrMapOvr>
+    <a:masterClrMapping/>
+  </p:clrMapOvr>
+</p:sld>
+</file>
+
+<file path=ppt/slides/slide15.xml><?xml version="1.0" encoding="utf-8"?>
+<p:sld xmlns:a="http://schemas.openxmlformats.org/drawingml/2006/main" xmlns:p="http://schemas.openxmlformats.org/presentationml/2006/main" xmlns:r="http://schemas.openxmlformats.org/officeDocument/2006/relationships">
+  <p:cSld>
+    <p:spTree>
+      <p:nvGrpSpPr>
+        <p:cNvPr id="1" name=""/>
+        <p:cNvGrpSpPr/>
+        <p:nvPr/>
+      </p:nvGrpSpPr>
+      <p:grpSpPr/>
+      <p:sp>
+        <p:nvSpPr>
+          <p:cNvPr id="2" name="Title 1"/>
+          <p:cNvSpPr>
+            <a:spLocks noGrp="1"/>
+          </p:cNvSpPr>
+          <p:nvPr>
+            <p:ph type="title"/>
+          </p:nvPr>
+        </p:nvSpPr>
+        <p:spPr/>
+        <p:txBody>
+          <a:bodyPr/>
+          <a:lstStyle/>
+          <a:p>
+            <a:r>
+              <a:t>Referências</a:t>
+            </a:r>
+          </a:p>
+        </p:txBody>
+      </p:sp>
+      <p:sp>
+        <p:nvSpPr>
+          <p:cNvPr id="3" name="Content Placeholder 2"/>
+          <p:cNvSpPr>
+            <a:spLocks noGrp="1"/>
+          </p:cNvSpPr>
+          <p:nvPr>
+            <p:ph idx="1"/>
+          </p:nvPr>
+        </p:nvSpPr>
+        <p:spPr/>
+        <p:txBody>
+          <a:bodyPr/>
+          <a:lstStyle/>
+          <a:p>
+            <a:r>
+              <a:t>Livros sobre compiladores</a:t>
+            </a:r>
+          </a:p>
+          <a:p>
+            <a:r>
+              <a:t>Artigos acadêmicos</a:t>
+            </a:r>
+          </a:p>
+          <a:p>
+            <a:r>
+              <a:t>Sites especializados em programação e compiladores</a:t>
+            </a:r>
+          </a:p>
+        </p:txBody>
+      </p:sp>
+    </p:spTree>
+  </p:cSld>
+  <p:clrMapOvr>
+    <a:masterClrMapping/>
+  </p:clrMapOvr>
+</p:sld>
+</file>
+
+<file path=ppt/slides/slide16.xml><?xml version="1.0" encoding="utf-8"?>
+<p:sld xmlns:a="http://schemas.openxmlformats.org/drawingml/2006/main" xmlns:p="http://schemas.openxmlformats.org/presentationml/2006/main" xmlns:r="http://schemas.openxmlformats.org/officeDocument/2006/relationships">
+  <p:cSld>
+    <p:spTree>
+      <p:nvGrpSpPr>
+        <p:cNvPr id="1" name=""/>
+        <p:cNvGrpSpPr/>
+        <p:nvPr/>
+      </p:nvGrpSpPr>
+      <p:grpSpPr/>
+      <p:sp>
+        <p:nvSpPr>
+          <p:cNvPr id="2" name="Title 1"/>
+          <p:cNvSpPr>
+            <a:spLocks noGrp="1"/>
+          </p:cNvSpPr>
+          <p:nvPr>
+            <p:ph type="title"/>
+          </p:nvPr>
+        </p:nvSpPr>
+        <p:spPr/>
+        <p:txBody>
+          <a:bodyPr/>
+          <a:lstStyle/>
+          <a:p>
+            <a:r>
+              <a:t>Perguntas</a:t>
+            </a:r>
+          </a:p>
+        </p:txBody>
+      </p:sp>
+      <p:sp>
+        <p:nvSpPr>
+          <p:cNvPr id="3" name="Content Placeholder 2"/>
+          <p:cNvSpPr>
+            <a:spLocks noGrp="1"/>
+          </p:cNvSpPr>
+          <p:nvPr>
+            <p:ph idx="1"/>
+          </p:nvPr>
+        </p:nvSpPr>
+        <p:spPr/>
+        <p:txBody>
+          <a:bodyPr/>
+          <a:lstStyle/>
+          <a:p>
+            <a:r>
+              <a:t>Momento para esclarecer dúvidas</a:t>
+            </a:r>
+          </a:p>
+          <a:p>
+            <a:r>
+              <a:t>Discussão sobre o tema</a:t>
+            </a:r>
+          </a:p>
+          <a:p>
+            <a:r>
+              <a:t>Agradecimentos.</a:t>
             </a:r>
           </a:p>
         </p:txBody>
@@ -3233,7 +3669,7 @@
           <a:lstStyle/>
           <a:p>
             <a:r>
-              <a:t>Introdução à Robótica</a:t>
+              <a:t>Introdução</a:t>
             </a:r>
           </a:p>
         </p:txBody>
@@ -3254,17 +3690,17 @@
           <a:lstStyle/>
           <a:p>
             <a:r>
-              <a:t>Definição de Robótica</a:t>
-            </a:r>
-          </a:p>
-          <a:p>
-            <a:r>
-              <a:t>História da Robótica</a:t>
-            </a:r>
-          </a:p>
-          <a:p>
-            <a:r>
-              <a:t>Aplicações da Robótica</a:t>
+              <a:t>Definição de compiladores</a:t>
+            </a:r>
+          </a:p>
+          <a:p>
+            <a:r>
+              <a:t>Importância na programação</a:t>
+            </a:r>
+          </a:p>
+          <a:p>
+            <a:r>
+              <a:t>Processo de compilação</a:t>
             </a:r>
           </a:p>
         </p:txBody>
@@ -3303,7 +3739,7 @@
           <a:lstStyle/>
           <a:p>
             <a:r>
-              <a:t>Componentes de um Robô</a:t>
+              <a:t>Fases de um compilador</a:t>
             </a:r>
           </a:p>
         </p:txBody>
@@ -3324,17 +3760,32 @@
           <a:lstStyle/>
           <a:p>
             <a:r>
-              <a:t>Sensores</a:t>
-            </a:r>
-          </a:p>
-          <a:p>
-            <a:r>
-              <a:t>Atuadores</a:t>
-            </a:r>
-          </a:p>
-          <a:p>
-            <a:r>
-              <a:t>Controladores</a:t>
+              <a:t>Análise léxica</a:t>
+            </a:r>
+          </a:p>
+          <a:p>
+            <a:r>
+              <a:t>Análise sintática</a:t>
+            </a:r>
+          </a:p>
+          <a:p>
+            <a:r>
+              <a:t>Análise semântica</a:t>
+            </a:r>
+          </a:p>
+          <a:p>
+            <a:r>
+              <a:t>Geração de código intermediário</a:t>
+            </a:r>
+          </a:p>
+          <a:p>
+            <a:r>
+              <a:t>Otimização de código</a:t>
+            </a:r>
+          </a:p>
+          <a:p>
+            <a:r>
+              <a:t>Geração de código final</a:t>
             </a:r>
           </a:p>
         </p:txBody>
@@ -3373,7 +3824,7 @@
           <a:lstStyle/>
           <a:p>
             <a:r>
-              <a:t>ipos de Robôs</a:t>
+              <a:t>Análise léxica</a:t>
             </a:r>
           </a:p>
         </p:txBody>
@@ -3394,22 +3845,17 @@
           <a:lstStyle/>
           <a:p>
             <a:r>
-              <a:t>Robôs Industriais</a:t>
-            </a:r>
-          </a:p>
-          <a:p>
-            <a:r>
-              <a:t>Robôs Móveis</a:t>
-            </a:r>
-          </a:p>
-          <a:p>
-            <a:r>
-              <a:t>Robôs Autônomos</a:t>
-            </a:r>
-          </a:p>
-          <a:p>
-            <a:r>
-              <a:t>Robôs Colaborativos</a:t>
+              <a:t>Identificação de tokens</a:t>
+            </a:r>
+          </a:p>
+          <a:p>
+            <a:r>
+              <a:t>Remoção de espaços em branco e comentários</a:t>
+            </a:r>
+          </a:p>
+          <a:p>
+            <a:r>
+              <a:t>Geração do código interno</a:t>
             </a:r>
           </a:p>
         </p:txBody>
@@ -3448,7 +3894,7 @@
           <a:lstStyle/>
           <a:p>
             <a:r>
-              <a:t>Aplicações da Robótica</a:t>
+              <a:t>Análise sintática</a:t>
             </a:r>
           </a:p>
         </p:txBody>
@@ -3469,22 +3915,17 @@
           <a:lstStyle/>
           <a:p>
             <a:r>
-              <a:t>Linha de produção automatizada</a:t>
-            </a:r>
-          </a:p>
-          <a:p>
-            <a:r>
-              <a:t>Robôs cirúrgicos</a:t>
-            </a:r>
-          </a:p>
-          <a:p>
-            <a:r>
-              <a:t>Robôs de exploração espacial</a:t>
-            </a:r>
-          </a:p>
-          <a:p>
-            <a:r>
-              <a:t>Robôs de entretenimento</a:t>
+              <a:t>Verificação da estrutura gramatical</a:t>
+            </a:r>
+          </a:p>
+          <a:p>
+            <a:r>
+              <a:t>Construção da árvore sintática</a:t>
+            </a:r>
+          </a:p>
+          <a:p>
+            <a:r>
+              <a:t>Detecção de erros sintáticos</a:t>
             </a:r>
           </a:p>
         </p:txBody>
@@ -3523,7 +3964,7 @@
           <a:lstStyle/>
           <a:p>
             <a:r>
-              <a:t>Robótica e Inteligência Artificial</a:t>
+              <a:t>Análise semântica</a:t>
             </a:r>
           </a:p>
         </p:txBody>
@@ -3544,17 +3985,17 @@
           <a:lstStyle/>
           <a:p>
             <a:r>
-              <a:t>Integração de IA nos robôs</a:t>
-            </a:r>
-          </a:p>
-          <a:p>
-            <a:r>
-              <a:t>Aprendizado de Máquina</a:t>
-            </a:r>
-          </a:p>
-          <a:p>
-            <a:r>
-              <a:t>Robôs autônomos</a:t>
+              <a:t>Verificação de tipos de dados</a:t>
+            </a:r>
+          </a:p>
+          <a:p>
+            <a:r>
+              <a:t>Resolução de ambiguidades</a:t>
+            </a:r>
+          </a:p>
+          <a:p>
+            <a:r>
+              <a:t>Verificação de escopo de variáveis</a:t>
             </a:r>
           </a:p>
         </p:txBody>
@@ -3593,7 +4034,7 @@
           <a:lstStyle/>
           <a:p>
             <a:r>
-              <a:t>Ética na Robótica</a:t>
+              <a:t>Geração de código intermediário</a:t>
             </a:r>
           </a:p>
         </p:txBody>
@@ -3614,17 +4055,17 @@
           <a:lstStyle/>
           <a:p>
             <a:r>
-              <a:t>Questões éticas em relação à autonomia dos robôs</a:t>
-            </a:r>
-          </a:p>
-          <a:p>
-            <a:r>
-              <a:t>Impacto social e econômico dos robôs</a:t>
-            </a:r>
-          </a:p>
-          <a:p>
-            <a:r>
-              <a:t>Responsabilidade e accountability na utilização de robôs</a:t>
+              <a:t>Representação intermédia</a:t>
+            </a:r>
+          </a:p>
+          <a:p>
+            <a:r>
+              <a:t>Facilita a otimização do código</a:t>
+            </a:r>
+          </a:p>
+          <a:p>
+            <a:r>
+              <a:t>Ponte entre as fases de análise e de geração de código final</a:t>
             </a:r>
           </a:p>
         </p:txBody>
@@ -3663,7 +4104,7 @@
           <a:lstStyle/>
           <a:p>
             <a:r>
-              <a:t>Desafios da Robótica</a:t>
+              <a:t>Otimização de código</a:t>
             </a:r>
           </a:p>
         </p:txBody>
@@ -3684,17 +4125,17 @@
           <a:lstStyle/>
           <a:p>
             <a:r>
-              <a:t>Manipulação de objetos complexos</a:t>
-            </a:r>
-          </a:p>
-          <a:p>
-            <a:r>
-              <a:t>Navegação autônoma em ambientes dinâmicos</a:t>
-            </a:r>
-          </a:p>
-          <a:p>
-            <a:r>
-              <a:t>Interpretação e execução de comandos humanos</a:t>
+              <a:t>Melhoria da eficiência do código</a:t>
+            </a:r>
+          </a:p>
+          <a:p>
+            <a:r>
+              <a:t>Redução de redundâncias</a:t>
+            </a:r>
+          </a:p>
+          <a:p>
+            <a:r>
+              <a:t>Exemplo de otimizações comuns</a:t>
             </a:r>
           </a:p>
         </p:txBody>
@@ -3733,7 +4174,7 @@
           <a:lstStyle/>
           <a:p>
             <a:r>
-              <a:t>Futuro da Robótica</a:t>
+              <a:t>Geração de código final</a:t>
             </a:r>
           </a:p>
         </p:txBody>
@@ -3754,17 +4195,17 @@
           <a:lstStyle/>
           <a:p>
             <a:r>
-              <a:t>Avanços tecnológicos</a:t>
-            </a:r>
-          </a:p>
-          <a:p>
-            <a:r>
-              <a:t>Integração cada vez maior de robôs na sociedade</a:t>
-            </a:r>
-          </a:p>
-          <a:p>
-            <a:r>
-              <a:t>Novas aplicações da robótica</a:t>
+              <a:t>Tradução do código intermediário para a linguagem de máquina</a:t>
+            </a:r>
+          </a:p>
+          <a:p>
+            <a:r>
+              <a:t>Uso de registradores e instruções específicas</a:t>
+            </a:r>
+          </a:p>
+          <a:p>
+            <a:r>
+              <a:t>Produção do executável final</a:t>
             </a:r>
           </a:p>
         </p:txBody>

</xml_diff>

<commit_message>
resolvido a adição de imagem aos slides no modo automático
</commit_message>
<xml_diff>
--- a/IA/auto_apresentacao_IA.pptx
+++ b/IA/auto_apresentacao_IA.pptx
@@ -20,7 +20,6 @@
     <p:sldId id="268" r:id="rId19"/>
     <p:sldId id="269" r:id="rId20"/>
     <p:sldId id="270" r:id="rId21"/>
-    <p:sldId id="271" r:id="rId22"/>
   </p:sldIdLst>
   <p:sldSz cx="9144000" cy="6858000" type="screen4x3"/>
   <p:notesSz cx="6858000" cy="9144000"/>
@@ -3119,7 +3118,7 @@
           <a:lstStyle/>
           <a:p>
             <a:r>
-              <a:t>Compiladores</a:t>
+              <a:t>NFL - National Football League</a:t>
             </a:r>
           </a:p>
         </p:txBody>
@@ -3140,7 +3139,7 @@
           <a:lstStyle/>
           <a:p>
             <a:r>
-              <a:t>Autor: Kézia Vasconcelos</a:t>
+              <a:t>Autor: Tom Brady</a:t>
             </a:r>
           </a:p>
         </p:txBody>
@@ -3179,7 +3178,7 @@
           <a:lstStyle/>
           <a:p>
             <a:r>
-              <a:t>Exemplos de compiladores</a:t>
+              <a:t>A importância dos treinadores na NFL</a:t>
             </a:r>
           </a:p>
         </p:txBody>
@@ -3200,17 +3199,17 @@
           <a:lstStyle/>
           <a:p>
             <a:r>
-              <a:t>GCC (GNU Compiler Collection)</a:t>
-            </a:r>
-          </a:p>
-          <a:p>
-            <a:r>
-              <a:t>Clang</a:t>
-            </a:r>
-          </a:p>
-          <a:p>
-            <a:r>
-              <a:t>Visual Studio Compiler</a:t>
+              <a:t>Os treinadores de um time são responsáveis por desenvolver estratégias, organizar treinos e motivar os jogadores</a:t>
+            </a:r>
+          </a:p>
+          <a:p>
+            <a:r>
+              <a:t>Grandes nomes como Bill Belichick, Vince Lombardi e Tom Landry se destacaram na NFL</a:t>
+            </a:r>
+          </a:p>
+          <a:p>
+            <a:r>
+              <a:t>O trabalho em equipe entre treinadores e jogadores é fundamental para o sucesso de um time</a:t>
             </a:r>
           </a:p>
         </p:txBody>
@@ -3249,7 +3248,7 @@
           <a:lstStyle/>
           <a:p>
             <a:r>
-              <a:t>Ferramentas auxiliares</a:t>
+              <a:t>A NFL no Brasil</a:t>
             </a:r>
           </a:p>
         </p:txBody>
@@ -3270,17 +3269,17 @@
           <a:lstStyle/>
           <a:p>
             <a:r>
-              <a:t>IDEs (Ambientes de Desenvolvimento Integrado)</a:t>
-            </a:r>
-          </a:p>
-          <a:p>
-            <a:r>
-              <a:t>Depuradores (debuggers)</a:t>
-            </a:r>
-          </a:p>
-          <a:p>
-            <a:r>
-              <a:t>Perfis de desempenho (profilers)</a:t>
+              <a:t>A NFL tem conquistado cada vez mais fãs no Brasil, com transmissões na TV e nas redes sociais</a:t>
+            </a:r>
+          </a:p>
+          <a:p>
+            <a:r>
+              <a:t>Eventos como o NFL Experience e o Draft Party proporcionam experiências únicas aos brasileiros apaixonados por futebol americano</a:t>
+            </a:r>
+          </a:p>
+          <a:p>
+            <a:r>
+              <a:t>A presença de jogadores brasileiros na liga, como Cairo Santos e Durval Queiroz Neto, aumentou o interesse pelo esporte no país</a:t>
             </a:r>
           </a:p>
         </p:txBody>
@@ -3319,7 +3318,7 @@
           <a:lstStyle/>
           <a:p>
             <a:r>
-              <a:t>Desafios na construção de compiladores</a:t>
+              <a:t>A tecnologia na NFL</a:t>
             </a:r>
           </a:p>
         </p:txBody>
@@ -3340,21 +3339,40 @@
           <a:lstStyle/>
           <a:p>
             <a:r>
-              <a:t>Lidar com ambiguidades na linguagem</a:t>
-            </a:r>
-          </a:p>
-          <a:p>
-            <a:r>
-              <a:t>Otimização de código eficiente</a:t>
-            </a:r>
-          </a:p>
-          <a:p>
-            <a:r>
-              <a:t>Suporte a múltiplas plataformas</a:t>
-            </a:r>
-          </a:p>
-        </p:txBody>
-      </p:sp>
+              <a:t>A NFL utiliza tecnologia avançada para aprimorar a experiência dos jogadores e dos espectadores</a:t>
+            </a:r>
+          </a:p>
+          <a:p>
+            <a:r>
+              <a:t>Equipamentos de última geração, análise de dados e transmissões em realidade virtual são algumas das inovações adotadas pela liga</a:t>
+            </a:r>
+          </a:p>
+        </p:txBody>
+      </p:sp>
+      <p:pic>
+        <p:nvPicPr>
+          <p:cNvPr id="4" name="Picture 3" descr="imagem_url.jpeg"/>
+          <p:cNvPicPr>
+            <a:picLocks noChangeAspect="1"/>
+          </p:cNvPicPr>
+          <p:nvPr/>
+        </p:nvPicPr>
+        <p:blipFill>
+          <a:blip r:embed="rId2"/>
+          <a:stretch>
+            <a:fillRect/>
+          </a:stretch>
+        </p:blipFill>
+        <p:spPr>
+          <a:xfrm>
+            <a:off x="2743200" y="4114800"/>
+            <a:ext cx="3810000" cy="2540000"/>
+          </a:xfrm>
+          <a:prstGeom prst="rect">
+            <a:avLst/>
+          </a:prstGeom>
+        </p:spPr>
+      </p:pic>
     </p:spTree>
   </p:cSld>
   <p:clrMapOvr>
@@ -3389,7 +3407,7 @@
           <a:lstStyle/>
           <a:p>
             <a:r>
-              <a:t>Futuro dos compiladores</a:t>
+              <a:t>A NFL e a comunidade</a:t>
             </a:r>
           </a:p>
         </p:txBody>
@@ -3410,17 +3428,17 @@
           <a:lstStyle/>
           <a:p>
             <a:r>
-              <a:t>Avanços em otimização de código</a:t>
-            </a:r>
-          </a:p>
-          <a:p>
-            <a:r>
-              <a:t>Aumento da integração com IDEs</a:t>
-            </a:r>
-          </a:p>
-          <a:p>
-            <a:r>
-              <a:t>Suporte a novas linguagens de programação</a:t>
+              <a:t>A NFL promove ações sociais e campanhas de responsabilidade social em parceria com instituições de caridade</a:t>
+            </a:r>
+          </a:p>
+          <a:p>
+            <a:r>
+              <a:t>Jogadores e times se envolvem em projetos comunitários, contribuindo para o desenvolvimento de crianças e jovens</a:t>
+            </a:r>
+          </a:p>
+          <a:p>
+            <a:r>
+              <a:t>A liga busca utilizar sua influência para gerar impacto positivo na sociedade</a:t>
             </a:r>
           </a:p>
         </p:txBody>
@@ -3459,7 +3477,7 @@
           <a:lstStyle/>
           <a:p>
             <a:r>
-              <a:t>Conclusão</a:t>
+              <a:t>O futuro da NFL</a:t>
             </a:r>
           </a:p>
         </p:txBody>
@@ -3480,17 +3498,17 @@
           <a:lstStyle/>
           <a:p>
             <a:r>
-              <a:t>Compiladores desempenham papel fundamental na programação</a:t>
-            </a:r>
-          </a:p>
-          <a:p>
-            <a:r>
-              <a:t>Processo de compilação é complexo e exige várias etapas</a:t>
-            </a:r>
-          </a:p>
-          <a:p>
-            <a:r>
-              <a:t>Importância de conhecer o funcionamento dos compiladores para programadores</a:t>
+              <a:t>A NFL busca constantemente inovar e se adaptar às novas tendências do esporte e da sociedade</a:t>
+            </a:r>
+          </a:p>
+          <a:p>
+            <a:r>
+              <a:t>O crescimento da liga a nível internacional e a expansão do futebol americano para outros países são desafios e oportunidades para o futuro</a:t>
+            </a:r>
+          </a:p>
+          <a:p>
+            <a:r>
+              <a:t>A paixão dos torcedores e a competitividade dos times garantem que a NFL continue sendo a liga de futebol americano mais popular do mundo</a:t>
             </a:r>
           </a:p>
         </p:txBody>
@@ -3550,91 +3568,45 @@
           <a:lstStyle/>
           <a:p>
             <a:r>
-              <a:t>Livros sobre compiladores</a:t>
-            </a:r>
-          </a:p>
-          <a:p>
-            <a:r>
-              <a:t>Artigos acadêmicos</a:t>
-            </a:r>
-          </a:p>
-          <a:p>
-            <a:r>
-              <a:t>Sites especializados em programação e compiladores</a:t>
-            </a:r>
-          </a:p>
-        </p:txBody>
-      </p:sp>
-    </p:spTree>
-  </p:cSld>
-  <p:clrMapOvr>
-    <a:masterClrMapping/>
-  </p:clrMapOvr>
-</p:sld>
-</file>
-
-<file path=ppt/slides/slide16.xml><?xml version="1.0" encoding="utf-8"?>
-<p:sld xmlns:a="http://schemas.openxmlformats.org/drawingml/2006/main" xmlns:p="http://schemas.openxmlformats.org/presentationml/2006/main" xmlns:r="http://schemas.openxmlformats.org/officeDocument/2006/relationships">
-  <p:cSld>
-    <p:spTree>
-      <p:nvGrpSpPr>
-        <p:cNvPr id="1" name=""/>
-        <p:cNvGrpSpPr/>
-        <p:nvPr/>
-      </p:nvGrpSpPr>
-      <p:grpSpPr/>
-      <p:sp>
-        <p:nvSpPr>
-          <p:cNvPr id="2" name="Title 1"/>
-          <p:cNvSpPr>
-            <a:spLocks noGrp="1"/>
-          </p:cNvSpPr>
-          <p:nvPr>
-            <p:ph type="title"/>
-          </p:nvPr>
-        </p:nvSpPr>
-        <p:spPr/>
-        <p:txBody>
-          <a:bodyPr/>
-          <a:lstStyle/>
-          <a:p>
-            <a:r>
-              <a:t>Perguntas</a:t>
-            </a:r>
-          </a:p>
-        </p:txBody>
-      </p:sp>
-      <p:sp>
-        <p:nvSpPr>
-          <p:cNvPr id="3" name="Content Placeholder 2"/>
-          <p:cNvSpPr>
-            <a:spLocks noGrp="1"/>
-          </p:cNvSpPr>
-          <p:nvPr>
-            <p:ph idx="1"/>
-          </p:nvPr>
-        </p:nvSpPr>
-        <p:spPr/>
-        <p:txBody>
-          <a:bodyPr/>
-          <a:lstStyle/>
-          <a:p>
-            <a:r>
-              <a:t>Momento para esclarecer dúvidas</a:t>
-            </a:r>
-          </a:p>
-          <a:p>
-            <a:r>
-              <a:t>Discussão sobre o tema</a:t>
-            </a:r>
-          </a:p>
-          <a:p>
-            <a:r>
-              <a:t>Agradecimentos.</a:t>
-            </a:r>
-          </a:p>
-        </p:txBody>
-      </p:sp>
+              <a:t>National Football League (NFL)</a:t>
+            </a:r>
+          </a:p>
+          <a:p>
+            <a:r>
+              <a:t>ESPN</a:t>
+            </a:r>
+          </a:p>
+          <a:p>
+            <a:r>
+              <a:t>NFL Brasil</a:t>
+            </a:r>
+          </a:p>
+        </p:txBody>
+      </p:sp>
+      <p:pic>
+        <p:nvPicPr>
+          <p:cNvPr id="4" name="Picture 3" descr="imagem_url.jpeg"/>
+          <p:cNvPicPr>
+            <a:picLocks noChangeAspect="1"/>
+          </p:cNvPicPr>
+          <p:nvPr/>
+        </p:nvPicPr>
+        <p:blipFill>
+          <a:blip r:embed="rId2"/>
+          <a:stretch>
+            <a:fillRect/>
+          </a:stretch>
+        </p:blipFill>
+        <p:spPr>
+          <a:xfrm>
+            <a:off x="2743200" y="4114800"/>
+            <a:ext cx="3810000" cy="2540000"/>
+          </a:xfrm>
+          <a:prstGeom prst="rect">
+            <a:avLst/>
+          </a:prstGeom>
+        </p:spPr>
+      </p:pic>
     </p:spTree>
   </p:cSld>
   <p:clrMapOvr>
@@ -3669,7 +3641,7 @@
           <a:lstStyle/>
           <a:p>
             <a:r>
-              <a:t>Introdução</a:t>
+              <a:t>O que é a NFL?</a:t>
             </a:r>
           </a:p>
         </p:txBody>
@@ -3688,19 +3660,20 @@
         <p:txBody>
           <a:bodyPr/>
           <a:lstStyle/>
-          <a:p>
-            <a:r>
-              <a:t>Definição de compiladores</a:t>
-            </a:r>
-          </a:p>
-          <a:p>
-            <a:r>
-              <a:t>Importância na programação</a:t>
-            </a:r>
-          </a:p>
-          <a:p>
-            <a:r>
-              <a:t>Processo de compilação</a:t>
+          <a:p/>
+          <a:p>
+            <a:r>
+              <a:t>A NFL é a principal liga de futebol americano dos Estados Unidos</a:t>
+            </a:r>
+          </a:p>
+          <a:p>
+            <a:r>
+              <a:t>Fundada em 1920, é atualmente composta por 32 times</a:t>
+            </a:r>
+          </a:p>
+          <a:p>
+            <a:r>
+              <a:t>A liga é dividida em duas conferências: a National Football Conference (NFC) e a American Football Conference (AFC)</a:t>
             </a:r>
           </a:p>
         </p:txBody>
@@ -3739,7 +3712,7 @@
           <a:lstStyle/>
           <a:p>
             <a:r>
-              <a:t>Fases de um compilador</a:t>
+              <a:t>História da NFL</a:t>
             </a:r>
           </a:p>
         </p:txBody>
@@ -3760,32 +3733,17 @@
           <a:lstStyle/>
           <a:p>
             <a:r>
-              <a:t>Análise léxica</a:t>
-            </a:r>
-          </a:p>
-          <a:p>
-            <a:r>
-              <a:t>Análise sintática</a:t>
-            </a:r>
-          </a:p>
-          <a:p>
-            <a:r>
-              <a:t>Análise semântica</a:t>
-            </a:r>
-          </a:p>
-          <a:p>
-            <a:r>
-              <a:t>Geração de código intermediário</a:t>
-            </a:r>
-          </a:p>
-          <a:p>
-            <a:r>
-              <a:t>Otimização de código</a:t>
-            </a:r>
-          </a:p>
-          <a:p>
-            <a:r>
-              <a:t>Geração de código final</a:t>
+              <a:t>A NFL teve origem a partir da American Professional Football Association, fundada em 1920</a:t>
+            </a:r>
+          </a:p>
+          <a:p>
+            <a:r>
+              <a:t>O Super Bowl, final da NFL, é um dos eventos esportivos mais assistidos do mundo</a:t>
+            </a:r>
+          </a:p>
+          <a:p>
+            <a:r>
+              <a:t>Grandes jogadores e times marcaram a história da liga, como os Green Bay Packers e Dallas Cowboys</a:t>
             </a:r>
           </a:p>
         </p:txBody>
@@ -3824,7 +3782,7 @@
           <a:lstStyle/>
           <a:p>
             <a:r>
-              <a:t>Análise léxica</a:t>
+              <a:t>Principais posições de um time na NFL</a:t>
             </a:r>
           </a:p>
         </p:txBody>
@@ -3845,21 +3803,45 @@
           <a:lstStyle/>
           <a:p>
             <a:r>
-              <a:t>Identificação de tokens</a:t>
-            </a:r>
-          </a:p>
-          <a:p>
-            <a:r>
-              <a:t>Remoção de espaços em branco e comentários</a:t>
-            </a:r>
-          </a:p>
-          <a:p>
-            <a:r>
-              <a:t>Geração do código interno</a:t>
-            </a:r>
-          </a:p>
-        </p:txBody>
-      </p:sp>
+              <a:t>Quarterback</a:t>
+            </a:r>
+          </a:p>
+          <a:p>
+            <a:r>
+              <a:t>Running back</a:t>
+            </a:r>
+          </a:p>
+          <a:p>
+            <a:r>
+              <a:t>Wide receiver</a:t>
+            </a:r>
+          </a:p>
+        </p:txBody>
+      </p:sp>
+      <p:pic>
+        <p:nvPicPr>
+          <p:cNvPr id="4" name="Picture 3" descr="imagem_url.jpeg"/>
+          <p:cNvPicPr>
+            <a:picLocks noChangeAspect="1"/>
+          </p:cNvPicPr>
+          <p:nvPr/>
+        </p:nvPicPr>
+        <p:blipFill>
+          <a:blip r:embed="rId2"/>
+          <a:stretch>
+            <a:fillRect/>
+          </a:stretch>
+        </p:blipFill>
+        <p:spPr>
+          <a:xfrm>
+            <a:off x="2743200" y="4114800"/>
+            <a:ext cx="3810000" cy="2540000"/>
+          </a:xfrm>
+          <a:prstGeom prst="rect">
+            <a:avLst/>
+          </a:prstGeom>
+        </p:spPr>
+      </p:pic>
     </p:spTree>
   </p:cSld>
   <p:clrMapOvr>
@@ -3894,7 +3876,7 @@
           <a:lstStyle/>
           <a:p>
             <a:r>
-              <a:t>Análise sintática</a:t>
+              <a:t>O papel do Quarterback na NFL</a:t>
             </a:r>
           </a:p>
         </p:txBody>
@@ -3915,17 +3897,17 @@
           <a:lstStyle/>
           <a:p>
             <a:r>
-              <a:t>Verificação da estrutura gramatical</a:t>
-            </a:r>
-          </a:p>
-          <a:p>
-            <a:r>
-              <a:t>Construção da árvore sintática</a:t>
-            </a:r>
-          </a:p>
-          <a:p>
-            <a:r>
-              <a:t>Detecção de erros sintáticos</a:t>
+              <a:t>O quarterback é o líder do ataque de um time</a:t>
+            </a:r>
+          </a:p>
+          <a:p>
+            <a:r>
+              <a:t>É responsável por lançar a bola para os recebedores e tomar as decisões táticas durante o jogo</a:t>
+            </a:r>
+          </a:p>
+          <a:p>
+            <a:r>
+              <a:t>Grandes quarterbacks da história da NFL incluem Tom Brady, Peyton Manning e Joe Montana</a:t>
             </a:r>
           </a:p>
         </p:txBody>
@@ -3964,7 +3946,7 @@
           <a:lstStyle/>
           <a:p>
             <a:r>
-              <a:t>Análise semântica</a:t>
+              <a:t>Curiosidades sobre a NFL</a:t>
             </a:r>
           </a:p>
         </p:txBody>
@@ -3985,17 +3967,17 @@
           <a:lstStyle/>
           <a:p>
             <a:r>
-              <a:t>Verificação de tipos de dados</a:t>
-            </a:r>
-          </a:p>
-          <a:p>
-            <a:r>
-              <a:t>Resolução de ambiguidades</a:t>
-            </a:r>
-          </a:p>
-          <a:p>
-            <a:r>
-              <a:t>Verificação de escopo de variáveis</a:t>
+              <a:t>O New England Patriots é o time com mais títulos de Super Bowl na história da liga</a:t>
+            </a:r>
+          </a:p>
+          <a:p>
+            <a:r>
+              <a:t>O Troféu Vince Lombardi é entregue ao campeão do Super Bowl</a:t>
+            </a:r>
+          </a:p>
+          <a:p>
+            <a:r>
+              <a:t>O Draft da NFL é o evento onde os times selecionam novos jogadores para seus elencos</a:t>
             </a:r>
           </a:p>
         </p:txBody>
@@ -4034,7 +4016,7 @@
           <a:lstStyle/>
           <a:p>
             <a:r>
-              <a:t>Geração de código intermediário</a:t>
+              <a:t>Os estádios da NFL</a:t>
             </a:r>
           </a:p>
         </p:txBody>
@@ -4055,21 +4037,40 @@
           <a:lstStyle/>
           <a:p>
             <a:r>
-              <a:t>Representação intermédia</a:t>
-            </a:r>
-          </a:p>
-          <a:p>
-            <a:r>
-              <a:t>Facilita a otimização do código</a:t>
-            </a:r>
-          </a:p>
-          <a:p>
-            <a:r>
-              <a:t>Ponte entre as fases de análise e de geração de código final</a:t>
-            </a:r>
-          </a:p>
-        </p:txBody>
-      </p:sp>
+              <a:t>A NFL conta com estádios icônicos, como o Lambeau Field, casa dos Green Bay Packers</a:t>
+            </a:r>
+          </a:p>
+          <a:p>
+            <a:r>
+              <a:t>Alguns estádios modernos contam com tecnologia de ponta e capacidade para dezenas de milhares de torcedores</a:t>
+            </a:r>
+          </a:p>
+        </p:txBody>
+      </p:sp>
+      <p:pic>
+        <p:nvPicPr>
+          <p:cNvPr id="4" name="Picture 3" descr="imagem_url.jpeg"/>
+          <p:cNvPicPr>
+            <a:picLocks noChangeAspect="1"/>
+          </p:cNvPicPr>
+          <p:nvPr/>
+        </p:nvPicPr>
+        <p:blipFill>
+          <a:blip r:embed="rId2"/>
+          <a:stretch>
+            <a:fillRect/>
+          </a:stretch>
+        </p:blipFill>
+        <p:spPr>
+          <a:xfrm>
+            <a:off x="2743200" y="4114800"/>
+            <a:ext cx="3810000" cy="2540000"/>
+          </a:xfrm>
+          <a:prstGeom prst="rect">
+            <a:avLst/>
+          </a:prstGeom>
+        </p:spPr>
+      </p:pic>
     </p:spTree>
   </p:cSld>
   <p:clrMapOvr>
@@ -4104,7 +4105,7 @@
           <a:lstStyle/>
           <a:p>
             <a:r>
-              <a:t>Otimização de código</a:t>
+              <a:t>O Pro Bowl</a:t>
             </a:r>
           </a:p>
         </p:txBody>
@@ -4125,17 +4126,17 @@
           <a:lstStyle/>
           <a:p>
             <a:r>
-              <a:t>Melhoria da eficiência do código</a:t>
-            </a:r>
-          </a:p>
-          <a:p>
-            <a:r>
-              <a:t>Redução de redundâncias</a:t>
-            </a:r>
-          </a:p>
-          <a:p>
-            <a:r>
-              <a:t>Exemplo de otimizações comuns</a:t>
+              <a:t>O Pro Bowl é o jogo das estrelas da NFL, onde os melhores jogadores da temporada se enfrentam</a:t>
+            </a:r>
+          </a:p>
+          <a:p>
+            <a:r>
+              <a:t>O evento é realizado na semana anterior ao Super Bowl</a:t>
+            </a:r>
+          </a:p>
+          <a:p>
+            <a:r>
+              <a:t>O Pro Bowl tem formatos diferentes ao longo dos anos, buscando sempre aumentar o interesse dos fãs</a:t>
             </a:r>
           </a:p>
         </p:txBody>
@@ -4174,7 +4175,7 @@
           <a:lstStyle/>
           <a:p>
             <a:r>
-              <a:t>Geração de código final</a:t>
+              <a:t>As rivalidades na NFL</a:t>
             </a:r>
           </a:p>
         </p:txBody>
@@ -4195,17 +4196,17 @@
           <a:lstStyle/>
           <a:p>
             <a:r>
-              <a:t>Tradução do código intermediário para a linguagem de máquina</a:t>
-            </a:r>
-          </a:p>
-          <a:p>
-            <a:r>
-              <a:t>Uso de registradores e instruções específicas</a:t>
-            </a:r>
-          </a:p>
-          <a:p>
-            <a:r>
-              <a:t>Produção do executável final</a:t>
+              <a:t>Rivalidades históricas como Green Bay Packers vs. Chicago Bears e Pittsburgh Steelers vs. Baltimore Ravens</a:t>
+            </a:r>
+          </a:p>
+          <a:p>
+            <a:r>
+              <a:t>Os jogos entre times da mesma divisão costumam ser os mais intensos</a:t>
+            </a:r>
+          </a:p>
+          <a:p>
+            <a:r>
+              <a:t>As rivalidades na NFL contribuem para o espírito competitivo e a paixão dos torcedores</a:t>
             </a:r>
           </a:p>
         </p:txBody>

</xml_diff>

<commit_message>
versão finalizada com exemplo da nfl
</commit_message>
<xml_diff>
--- a/IA/auto_apresentacao_IA.pptx
+++ b/IA/auto_apresentacao_IA.pptx
@@ -20,6 +20,10 @@
     <p:sldId id="268" r:id="rId19"/>
     <p:sldId id="269" r:id="rId20"/>
     <p:sldId id="270" r:id="rId21"/>
+    <p:sldId id="271" r:id="rId22"/>
+    <p:sldId id="272" r:id="rId23"/>
+    <p:sldId id="273" r:id="rId24"/>
+    <p:sldId id="274" r:id="rId25"/>
   </p:sldIdLst>
   <p:sldSz cx="9144000" cy="6858000" type="screen4x3"/>
   <p:notesSz cx="6858000" cy="9144000"/>
@@ -3118,7 +3122,7 @@
           <a:lstStyle/>
           <a:p>
             <a:r>
-              <a:t>NFL - National Football League</a:t>
+              <a:t>NFL - National Football League </a:t>
             </a:r>
           </a:p>
         </p:txBody>
@@ -3139,7 +3143,7 @@
           <a:lstStyle/>
           <a:p>
             <a:r>
-              <a:t>Autor: Tom Brady</a:t>
+              <a:t>Autor: Tom Brady </a:t>
             </a:r>
           </a:p>
         </p:txBody>
@@ -3178,7 +3182,7 @@
           <a:lstStyle/>
           <a:p>
             <a:r>
-              <a:t>A importância dos treinadores na NFL</a:t>
+              <a:t>Draft da NFL </a:t>
             </a:r>
           </a:p>
         </p:txBody>
@@ -3199,17 +3203,17 @@
           <a:lstStyle/>
           <a:p>
             <a:r>
-              <a:t>Os treinadores de um time são responsáveis por desenvolver estratégias, organizar treinos e motivar os jogadores</a:t>
-            </a:r>
-          </a:p>
-          <a:p>
-            <a:r>
-              <a:t>Grandes nomes como Bill Belichick, Vince Lombardi e Tom Landry se destacaram na NFL</a:t>
-            </a:r>
-          </a:p>
-          <a:p>
-            <a:r>
-              <a:t>O trabalho em equipe entre treinadores e jogadores é fundamental para o sucesso de um time</a:t>
+              <a:t>Seleção de novos jogadores para os times</a:t>
+            </a:r>
+          </a:p>
+          <a:p>
+            <a:r>
+              <a:t>Realizado anualmente</a:t>
+            </a:r>
+          </a:p>
+          <a:p>
+            <a:r>
+              <a:t>Momento crucial para a renovação das equipes</a:t>
             </a:r>
           </a:p>
         </p:txBody>
@@ -3248,7 +3252,7 @@
           <a:lstStyle/>
           <a:p>
             <a:r>
-              <a:t>A NFL no Brasil</a:t>
+              <a:t>Rivalidades históricas </a:t>
             </a:r>
           </a:p>
         </p:txBody>
@@ -3269,17 +3273,17 @@
           <a:lstStyle/>
           <a:p>
             <a:r>
-              <a:t>A NFL tem conquistado cada vez mais fãs no Brasil, com transmissões na TV e nas redes sociais</a:t>
-            </a:r>
-          </a:p>
-          <a:p>
-            <a:r>
-              <a:t>Eventos como o NFL Experience e o Draft Party proporcionam experiências únicas aos brasileiros apaixonados por futebol americano</a:t>
-            </a:r>
-          </a:p>
-          <a:p>
-            <a:r>
-              <a:t>A presença de jogadores brasileiros na liga, como Cairo Santos e Durval Queiroz Neto, aumentou o interesse pelo esporte no país</a:t>
+              <a:t>Cowboys vs. Redskins</a:t>
+            </a:r>
+          </a:p>
+          <a:p>
+            <a:r>
+              <a:t>Packers vs. Bears</a:t>
+            </a:r>
+          </a:p>
+          <a:p>
+            <a:r>
+              <a:t>Steelers vs. Ravens</a:t>
             </a:r>
           </a:p>
         </p:txBody>
@@ -3318,7 +3322,7 @@
           <a:lstStyle/>
           <a:p>
             <a:r>
-              <a:t>A tecnologia na NFL</a:t>
+              <a:t>Cheerleaders </a:t>
             </a:r>
           </a:p>
         </p:txBody>
@@ -3339,40 +3343,21 @@
           <a:lstStyle/>
           <a:p>
             <a:r>
-              <a:t>A NFL utiliza tecnologia avançada para aprimorar a experiência dos jogadores e dos espectadores</a:t>
-            </a:r>
-          </a:p>
-          <a:p>
-            <a:r>
-              <a:t>Equipamentos de última geração, análise de dados e transmissões em realidade virtual são algumas das inovações adotadas pela liga</a:t>
-            </a:r>
-          </a:p>
-        </p:txBody>
-      </p:sp>
-      <p:pic>
-        <p:nvPicPr>
-          <p:cNvPr id="4" name="Picture 3" descr="imagem_url.jpeg"/>
-          <p:cNvPicPr>
-            <a:picLocks noChangeAspect="1"/>
-          </p:cNvPicPr>
-          <p:nvPr/>
-        </p:nvPicPr>
-        <p:blipFill>
-          <a:blip r:embed="rId2"/>
-          <a:stretch>
-            <a:fillRect/>
-          </a:stretch>
-        </p:blipFill>
-        <p:spPr>
-          <a:xfrm>
-            <a:off x="2743200" y="4114800"/>
-            <a:ext cx="3810000" cy="2540000"/>
-          </a:xfrm>
-          <a:prstGeom prst="rect">
-            <a:avLst/>
-          </a:prstGeom>
-        </p:spPr>
-      </p:pic>
+              <a:t>Presentes em muitos jogos da NFL</a:t>
+            </a:r>
+          </a:p>
+          <a:p>
+            <a:r>
+              <a:t>Animam a torcida</a:t>
+            </a:r>
+          </a:p>
+          <a:p>
+            <a:r>
+              <a:t>Parte tradicional das equipes</a:t>
+            </a:r>
+          </a:p>
+        </p:txBody>
+      </p:sp>
     </p:spTree>
   </p:cSld>
   <p:clrMapOvr>
@@ -3407,7 +3392,7 @@
           <a:lstStyle/>
           <a:p>
             <a:r>
-              <a:t>A NFL e a comunidade</a:t>
+              <a:t>Hall da Fama </a:t>
             </a:r>
           </a:p>
         </p:txBody>
@@ -3428,17 +3413,17 @@
           <a:lstStyle/>
           <a:p>
             <a:r>
-              <a:t>A NFL promove ações sociais e campanhas de responsabilidade social em parceria com instituições de caridade</a:t>
-            </a:r>
-          </a:p>
-          <a:p>
-            <a:r>
-              <a:t>Jogadores e times se envolvem em projetos comunitários, contribuindo para o desenvolvimento de crianças e jovens</a:t>
-            </a:r>
-          </a:p>
-          <a:p>
-            <a:r>
-              <a:t>A liga busca utilizar sua influência para gerar impacto positivo na sociedade</a:t>
+              <a:t>Os grandes ícones da NFL</a:t>
+            </a:r>
+          </a:p>
+          <a:p>
+            <a:r>
+              <a:t>Jogadores, treinadores e contribuintes</a:t>
+            </a:r>
+          </a:p>
+          <a:p>
+            <a:r>
+              <a:t>Local de homenagem aos melhores da história</a:t>
             </a:r>
           </a:p>
         </p:txBody>
@@ -3477,7 +3462,7 @@
           <a:lstStyle/>
           <a:p>
             <a:r>
-              <a:t>O futuro da NFL</a:t>
+              <a:t>Regras do jogo </a:t>
             </a:r>
           </a:p>
         </p:txBody>
@@ -3498,17 +3483,17 @@
           <a:lstStyle/>
           <a:p>
             <a:r>
-              <a:t>A NFL busca constantemente inovar e se adaptar às novas tendências do esporte e da sociedade</a:t>
-            </a:r>
-          </a:p>
-          <a:p>
-            <a:r>
-              <a:t>O crescimento da liga a nível internacional e a expansão do futebol americano para outros países são desafios e oportunidades para o futuro</a:t>
-            </a:r>
-          </a:p>
-          <a:p>
-            <a:r>
-              <a:t>A paixão dos torcedores e a competitividade dos times garantem que a NFL continue sendo a liga de futebol americano mais popular do mundo</a:t>
+              <a:t>Touchdown</a:t>
+            </a:r>
+          </a:p>
+          <a:p>
+            <a:r>
+              <a:t>Field goal</a:t>
+            </a:r>
+          </a:p>
+          <a:p>
+            <a:r>
+              <a:t>Quarto down</a:t>
             </a:r>
           </a:p>
         </p:txBody>
@@ -3547,7 +3532,7 @@
           <a:lstStyle/>
           <a:p>
             <a:r>
-              <a:t>Referências</a:t>
+              <a:t>Lesões na NFL </a:t>
             </a:r>
           </a:p>
         </p:txBody>
@@ -3568,45 +3553,301 @@
           <a:lstStyle/>
           <a:p>
             <a:r>
-              <a:t>National Football League (NFL)</a:t>
-            </a:r>
-          </a:p>
-          <a:p>
-            <a:r>
-              <a:t>ESPN</a:t>
-            </a:r>
-          </a:p>
-          <a:p>
-            <a:r>
-              <a:t>NFL Brasil</a:t>
-            </a:r>
-          </a:p>
-        </p:txBody>
-      </p:sp>
-      <p:pic>
-        <p:nvPicPr>
-          <p:cNvPr id="4" name="Picture 3" descr="imagem_url.jpeg"/>
-          <p:cNvPicPr>
-            <a:picLocks noChangeAspect="1"/>
-          </p:cNvPicPr>
-          <p:nvPr/>
-        </p:nvPicPr>
-        <p:blipFill>
-          <a:blip r:embed="rId2"/>
-          <a:stretch>
-            <a:fillRect/>
-          </a:stretch>
-        </p:blipFill>
-        <p:spPr>
-          <a:xfrm>
-            <a:off x="2743200" y="4114800"/>
-            <a:ext cx="3810000" cy="2540000"/>
-          </a:xfrm>
-          <a:prstGeom prst="rect">
-            <a:avLst/>
-          </a:prstGeom>
-        </p:spPr>
-      </p:pic>
+              <a:t>Parte inevitável do esporte</a:t>
+            </a:r>
+          </a:p>
+          <a:p>
+            <a:r>
+              <a:t>Cuidados médicos para os jogadores</a:t>
+            </a:r>
+          </a:p>
+          <a:p>
+            <a:r>
+              <a:t>Preocupação constante da liga</a:t>
+            </a:r>
+          </a:p>
+        </p:txBody>
+      </p:sp>
+    </p:spTree>
+  </p:cSld>
+  <p:clrMapOvr>
+    <a:masterClrMapping/>
+  </p:clrMapOvr>
+</p:sld>
+</file>
+
+<file path=ppt/slides/slide16.xml><?xml version="1.0" encoding="utf-8"?>
+<p:sld xmlns:a="http://schemas.openxmlformats.org/drawingml/2006/main" xmlns:p="http://schemas.openxmlformats.org/presentationml/2006/main" xmlns:r="http://schemas.openxmlformats.org/officeDocument/2006/relationships">
+  <p:cSld>
+    <p:spTree>
+      <p:nvGrpSpPr>
+        <p:cNvPr id="1" name=""/>
+        <p:cNvGrpSpPr/>
+        <p:nvPr/>
+      </p:nvGrpSpPr>
+      <p:grpSpPr/>
+      <p:sp>
+        <p:nvSpPr>
+          <p:cNvPr id="2" name="Title 1"/>
+          <p:cNvSpPr>
+            <a:spLocks noGrp="1"/>
+          </p:cNvSpPr>
+          <p:nvPr>
+            <p:ph type="title"/>
+          </p:nvPr>
+        </p:nvSpPr>
+        <p:spPr/>
+        <p:txBody>
+          <a:bodyPr/>
+          <a:lstStyle/>
+          <a:p>
+            <a:r>
+              <a:t>Celebridades na NFL </a:t>
+            </a:r>
+          </a:p>
+        </p:txBody>
+      </p:sp>
+      <p:sp>
+        <p:nvSpPr>
+          <p:cNvPr id="3" name="Content Placeholder 2"/>
+          <p:cNvSpPr>
+            <a:spLocks noGrp="1"/>
+          </p:cNvSpPr>
+          <p:nvPr>
+            <p:ph idx="1"/>
+          </p:nvPr>
+        </p:nvSpPr>
+        <p:spPr/>
+        <p:txBody>
+          <a:bodyPr/>
+          <a:lstStyle/>
+          <a:p>
+            <a:r>
+              <a:t>Jay-Z</a:t>
+            </a:r>
+          </a:p>
+          <a:p>
+            <a:r>
+              <a:t>Beyoncé</a:t>
+            </a:r>
+          </a:p>
+          <a:p>
+            <a:r>
+              <a:t>Justin Timberlake</a:t>
+            </a:r>
+          </a:p>
+        </p:txBody>
+      </p:sp>
+    </p:spTree>
+  </p:cSld>
+  <p:clrMapOvr>
+    <a:masterClrMapping/>
+  </p:clrMapOvr>
+</p:sld>
+</file>
+
+<file path=ppt/slides/slide17.xml><?xml version="1.0" encoding="utf-8"?>
+<p:sld xmlns:a="http://schemas.openxmlformats.org/drawingml/2006/main" xmlns:p="http://schemas.openxmlformats.org/presentationml/2006/main" xmlns:r="http://schemas.openxmlformats.org/officeDocument/2006/relationships">
+  <p:cSld>
+    <p:spTree>
+      <p:nvGrpSpPr>
+        <p:cNvPr id="1" name=""/>
+        <p:cNvGrpSpPr/>
+        <p:nvPr/>
+      </p:nvGrpSpPr>
+      <p:grpSpPr/>
+      <p:sp>
+        <p:nvSpPr>
+          <p:cNvPr id="2" name="Title 1"/>
+          <p:cNvSpPr>
+            <a:spLocks noGrp="1"/>
+          </p:cNvSpPr>
+          <p:nvPr>
+            <p:ph type="title"/>
+          </p:nvPr>
+        </p:nvSpPr>
+        <p:spPr/>
+        <p:txBody>
+          <a:bodyPr/>
+          <a:lstStyle/>
+          <a:p>
+            <a:r>
+              <a:t>NFL e a cultura americana </a:t>
+            </a:r>
+          </a:p>
+        </p:txBody>
+      </p:sp>
+      <p:sp>
+        <p:nvSpPr>
+          <p:cNvPr id="3" name="Content Placeholder 2"/>
+          <p:cNvSpPr>
+            <a:spLocks noGrp="1"/>
+          </p:cNvSpPr>
+          <p:nvPr>
+            <p:ph idx="1"/>
+          </p:nvPr>
+        </p:nvSpPr>
+        <p:spPr/>
+        <p:txBody>
+          <a:bodyPr/>
+          <a:lstStyle/>
+          <a:p>
+            <a:r>
+              <a:t>Evento esportivo de grande importância</a:t>
+            </a:r>
+          </a:p>
+          <a:p>
+            <a:r>
+              <a:t>Comerciais no Super Bowl</a:t>
+            </a:r>
+          </a:p>
+          <a:p>
+            <a:r>
+              <a:t>Influência na moda e música</a:t>
+            </a:r>
+          </a:p>
+        </p:txBody>
+      </p:sp>
+    </p:spTree>
+  </p:cSld>
+  <p:clrMapOvr>
+    <a:masterClrMapping/>
+  </p:clrMapOvr>
+</p:sld>
+</file>
+
+<file path=ppt/slides/slide18.xml><?xml version="1.0" encoding="utf-8"?>
+<p:sld xmlns:a="http://schemas.openxmlformats.org/drawingml/2006/main" xmlns:p="http://schemas.openxmlformats.org/presentationml/2006/main" xmlns:r="http://schemas.openxmlformats.org/officeDocument/2006/relationships">
+  <p:cSld>
+    <p:spTree>
+      <p:nvGrpSpPr>
+        <p:cNvPr id="1" name=""/>
+        <p:cNvGrpSpPr/>
+        <p:nvPr/>
+      </p:nvGrpSpPr>
+      <p:grpSpPr/>
+      <p:sp>
+        <p:nvSpPr>
+          <p:cNvPr id="2" name="Title 1"/>
+          <p:cNvSpPr>
+            <a:spLocks noGrp="1"/>
+          </p:cNvSpPr>
+          <p:nvPr>
+            <p:ph type="title"/>
+          </p:nvPr>
+        </p:nvSpPr>
+        <p:spPr/>
+        <p:txBody>
+          <a:bodyPr/>
+          <a:lstStyle/>
+          <a:p>
+            <a:r>
+              <a:t>Futuro da NFL </a:t>
+            </a:r>
+          </a:p>
+        </p:txBody>
+      </p:sp>
+      <p:sp>
+        <p:nvSpPr>
+          <p:cNvPr id="3" name="Content Placeholder 2"/>
+          <p:cNvSpPr>
+            <a:spLocks noGrp="1"/>
+          </p:cNvSpPr>
+          <p:nvPr>
+            <p:ph idx="1"/>
+          </p:nvPr>
+        </p:nvSpPr>
+        <p:spPr/>
+        <p:txBody>
+          <a:bodyPr/>
+          <a:lstStyle/>
+          <a:p>
+            <a:r>
+              <a:t>Expansão para outros países</a:t>
+            </a:r>
+          </a:p>
+          <a:p>
+            <a:r>
+              <a:t>Novas tecnologias</a:t>
+            </a:r>
+          </a:p>
+          <a:p>
+            <a:r>
+              <a:t>Sustentabilidade e responsabilidade social</a:t>
+            </a:r>
+          </a:p>
+        </p:txBody>
+      </p:sp>
+    </p:spTree>
+  </p:cSld>
+  <p:clrMapOvr>
+    <a:masterClrMapping/>
+  </p:clrMapOvr>
+</p:sld>
+</file>
+
+<file path=ppt/slides/slide19.xml><?xml version="1.0" encoding="utf-8"?>
+<p:sld xmlns:a="http://schemas.openxmlformats.org/drawingml/2006/main" xmlns:p="http://schemas.openxmlformats.org/presentationml/2006/main" xmlns:r="http://schemas.openxmlformats.org/officeDocument/2006/relationships">
+  <p:cSld>
+    <p:spTree>
+      <p:nvGrpSpPr>
+        <p:cNvPr id="1" name=""/>
+        <p:cNvGrpSpPr/>
+        <p:nvPr/>
+      </p:nvGrpSpPr>
+      <p:grpSpPr/>
+      <p:sp>
+        <p:nvSpPr>
+          <p:cNvPr id="2" name="Title 1"/>
+          <p:cNvSpPr>
+            <a:spLocks noGrp="1"/>
+          </p:cNvSpPr>
+          <p:nvPr>
+            <p:ph type="title"/>
+          </p:nvPr>
+        </p:nvSpPr>
+        <p:spPr/>
+        <p:txBody>
+          <a:bodyPr/>
+          <a:lstStyle/>
+          <a:p>
+            <a:r>
+              <a:t>Obrigado! </a:t>
+            </a:r>
+          </a:p>
+        </p:txBody>
+      </p:sp>
+      <p:sp>
+        <p:nvSpPr>
+          <p:cNvPr id="3" name="Content Placeholder 2"/>
+          <p:cNvSpPr>
+            <a:spLocks noGrp="1"/>
+          </p:cNvSpPr>
+          <p:nvPr>
+            <p:ph idx="1"/>
+          </p:nvPr>
+        </p:nvSpPr>
+        <p:spPr/>
+        <p:txBody>
+          <a:bodyPr/>
+          <a:lstStyle/>
+          <a:p>
+            <a:r>
+              <a:t>Obrigado pela atenção</a:t>
+            </a:r>
+          </a:p>
+          <a:p>
+            <a:r>
+              <a:t>Qualquer dúvida, estamos à disposição</a:t>
+            </a:r>
+          </a:p>
+          <a:p>
+            <a:r>
+              <a:t>Tom Brady - autor da apresentação</a:t>
+            </a:r>
+          </a:p>
+        </p:txBody>
+      </p:sp>
     </p:spTree>
   </p:cSld>
   <p:clrMapOvr>
@@ -3641,7 +3882,7 @@
           <a:lstStyle/>
           <a:p>
             <a:r>
-              <a:t>O que é a NFL?</a:t>
+              <a:t>O que é a NFL? </a:t>
             </a:r>
           </a:p>
         </p:txBody>
@@ -3663,17 +3904,17 @@
           <a:p/>
           <a:p>
             <a:r>
-              <a:t>A NFL é a principal liga de futebol americano dos Estados Unidos</a:t>
-            </a:r>
-          </a:p>
-          <a:p>
-            <a:r>
-              <a:t>Fundada em 1920, é atualmente composta por 32 times</a:t>
-            </a:r>
-          </a:p>
-          <a:p>
-            <a:r>
-              <a:t>A liga é dividida em duas conferências: a National Football Conference (NFC) e a American Football Conference (AFC)</a:t>
+              <a:t>A National Football League é a principal liga de futebol americano dos Estados Unidos</a:t>
+            </a:r>
+          </a:p>
+          <a:p>
+            <a:r>
+              <a:t>Fundada em 1920</a:t>
+            </a:r>
+          </a:p>
+          <a:p>
+            <a:r>
+              <a:t>Atualmente conta com 32 times</a:t>
             </a:r>
           </a:p>
         </p:txBody>
@@ -3712,7 +3953,7 @@
           <a:lstStyle/>
           <a:p>
             <a:r>
-              <a:t>História da NFL</a:t>
+              <a:t>Estrutura da NFL </a:t>
             </a:r>
           </a:p>
         </p:txBody>
@@ -3733,17 +3974,17 @@
           <a:lstStyle/>
           <a:p>
             <a:r>
-              <a:t>A NFL teve origem a partir da American Professional Football Association, fundada em 1920</a:t>
-            </a:r>
-          </a:p>
-          <a:p>
-            <a:r>
-              <a:t>O Super Bowl, final da NFL, é um dos eventos esportivos mais assistidos do mundo</a:t>
-            </a:r>
-          </a:p>
-          <a:p>
-            <a:r>
-              <a:t>Grandes jogadores e times marcaram a história da liga, como os Green Bay Packers e Dallas Cowboys</a:t>
+              <a:t>Dividida em duas conferências: AFC (American Football Conference) e NFC (National Football Conference)</a:t>
+            </a:r>
+          </a:p>
+          <a:p>
+            <a:r>
+              <a:t>Cada conferência possui 4 divisões com 4 times em cada uma</a:t>
+            </a:r>
+          </a:p>
+          <a:p>
+            <a:r>
+              <a:t>Temporada regular com 17 jogos, seguida dos playoffs</a:t>
             </a:r>
           </a:p>
         </p:txBody>
@@ -3782,7 +4023,7 @@
           <a:lstStyle/>
           <a:p>
             <a:r>
-              <a:t>Principais posições de um time na NFL</a:t>
+              <a:t>Jogadores e posições </a:t>
             </a:r>
           </a:p>
         </p:txBody>
@@ -3820,7 +4061,7 @@
       </p:sp>
       <p:pic>
         <p:nvPicPr>
-          <p:cNvPr id="4" name="Picture 3" descr="imagem_url.jpeg"/>
+          <p:cNvPr id="4" name="Picture 3" descr="imagem_url2.jpeg"/>
           <p:cNvPicPr>
             <a:picLocks noChangeAspect="1"/>
           </p:cNvPicPr>
@@ -3876,7 +4117,7 @@
           <a:lstStyle/>
           <a:p>
             <a:r>
-              <a:t>O papel do Quarterback na NFL</a:t>
+              <a:t>Principais times </a:t>
             </a:r>
           </a:p>
         </p:txBody>
@@ -3897,17 +4138,17 @@
           <a:lstStyle/>
           <a:p>
             <a:r>
-              <a:t>O quarterback é o líder do ataque de um time</a:t>
-            </a:r>
-          </a:p>
-          <a:p>
-            <a:r>
-              <a:t>É responsável por lançar a bola para os recebedores e tomar as decisões táticas durante o jogo</a:t>
-            </a:r>
-          </a:p>
-          <a:p>
-            <a:r>
-              <a:t>Grandes quarterbacks da história da NFL incluem Tom Brady, Peyton Manning e Joe Montana</a:t>
+              <a:t>New England Patriots</a:t>
+            </a:r>
+          </a:p>
+          <a:p>
+            <a:r>
+              <a:t>Dallas Cowboys</a:t>
+            </a:r>
+          </a:p>
+          <a:p>
+            <a:r>
+              <a:t>Green Bay Packers</a:t>
             </a:r>
           </a:p>
         </p:txBody>
@@ -3946,7 +4187,7 @@
           <a:lstStyle/>
           <a:p>
             <a:r>
-              <a:t>Curiosidades sobre a NFL</a:t>
+              <a:t>Super Bowl </a:t>
             </a:r>
           </a:p>
         </p:txBody>
@@ -3967,17 +4208,17 @@
           <a:lstStyle/>
           <a:p>
             <a:r>
-              <a:t>O New England Patriots é o time com mais títulos de Super Bowl na história da liga</a:t>
-            </a:r>
-          </a:p>
-          <a:p>
-            <a:r>
-              <a:t>O Troféu Vince Lombardi é entregue ao campeão do Super Bowl</a:t>
-            </a:r>
-          </a:p>
-          <a:p>
-            <a:r>
-              <a:t>O Draft da NFL é o evento onde os times selecionam novos jogadores para seus elencos</a:t>
+              <a:t>Final da NFL</a:t>
+            </a:r>
+          </a:p>
+          <a:p>
+            <a:r>
+              <a:t>Disputado entre os campeões da AFC e NFC</a:t>
+            </a:r>
+          </a:p>
+          <a:p>
+            <a:r>
+              <a:t>Evento de grande audiência mundial</a:t>
             </a:r>
           </a:p>
         </p:txBody>
@@ -4016,7 +4257,7 @@
           <a:lstStyle/>
           <a:p>
             <a:r>
-              <a:t>Os estádios da NFL</a:t>
+              <a:t>Estádios icônicos </a:t>
             </a:r>
           </a:p>
         </p:txBody>
@@ -4037,19 +4278,19 @@
           <a:lstStyle/>
           <a:p>
             <a:r>
-              <a:t>A NFL conta com estádios icônicos, como o Lambeau Field, casa dos Green Bay Packers</a:t>
-            </a:r>
-          </a:p>
-          <a:p>
-            <a:r>
-              <a:t>Alguns estádios modernos contam com tecnologia de ponta e capacidade para dezenas de milhares de torcedores</a:t>
+              <a:t>Lambeau Field</a:t>
+            </a:r>
+          </a:p>
+          <a:p>
+            <a:r>
+              <a:t>Soldier Field</a:t>
             </a:r>
           </a:p>
         </p:txBody>
       </p:sp>
       <p:pic>
         <p:nvPicPr>
-          <p:cNvPr id="4" name="Picture 3" descr="imagem_url.jpeg"/>
+          <p:cNvPr id="4" name="Picture 3" descr="imagem_url5.jpeg"/>
           <p:cNvPicPr>
             <a:picLocks noChangeAspect="1"/>
           </p:cNvPicPr>
@@ -4105,7 +4346,7 @@
           <a:lstStyle/>
           <a:p>
             <a:r>
-              <a:t>O Pro Bowl</a:t>
+              <a:t>Recordes na NFL </a:t>
             </a:r>
           </a:p>
         </p:txBody>
@@ -4126,17 +4367,17 @@
           <a:lstStyle/>
           <a:p>
             <a:r>
-              <a:t>O Pro Bowl é o jogo das estrelas da NFL, onde os melhores jogadores da temporada se enfrentam</a:t>
-            </a:r>
-          </a:p>
-          <a:p>
-            <a:r>
-              <a:t>O evento é realizado na semana anterior ao Super Bowl</a:t>
-            </a:r>
-          </a:p>
-          <a:p>
-            <a:r>
-              <a:t>O Pro Bowl tem formatos diferentes ao longo dos anos, buscando sempre aumentar o interesse dos fãs</a:t>
+              <a:t>Peyton Manning - maior número de touchdowns</a:t>
+            </a:r>
+          </a:p>
+          <a:p>
+            <a:r>
+              <a:t>Jerry Rice - maior número de recepções</a:t>
+            </a:r>
+          </a:p>
+          <a:p>
+            <a:r>
+              <a:t>Adam Vinatieri - maior número de field goals</a:t>
             </a:r>
           </a:p>
         </p:txBody>
@@ -4175,7 +4416,7 @@
           <a:lstStyle/>
           <a:p>
             <a:r>
-              <a:t>As rivalidades na NFL</a:t>
+              <a:t>Pro Bowl </a:t>
             </a:r>
           </a:p>
         </p:txBody>
@@ -4196,17 +4437,17 @@
           <a:lstStyle/>
           <a:p>
             <a:r>
-              <a:t>Rivalidades históricas como Green Bay Packers vs. Chicago Bears e Pittsburgh Steelers vs. Baltimore Ravens</a:t>
-            </a:r>
-          </a:p>
-          <a:p>
-            <a:r>
-              <a:t>Os jogos entre times da mesma divisão costumam ser os mais intensos</a:t>
-            </a:r>
-          </a:p>
-          <a:p>
-            <a:r>
-              <a:t>As rivalidades na NFL contribuem para o espírito competitivo e a paixão dos torcedores</a:t>
+              <a:t>Jogo das estrelas da NFL</a:t>
+            </a:r>
+          </a:p>
+          <a:p>
+            <a:r>
+              <a:t>Realizado após o fim da temporada regular</a:t>
+            </a:r>
+          </a:p>
+          <a:p>
+            <a:r>
+              <a:t>Confronto entre os melhores jogadores da AFC e NFC</a:t>
             </a:r>
           </a:p>
         </p:txBody>

</xml_diff>